<commit_message>
Add includes and extends to UML use case
</commit_message>
<xml_diff>
--- a/software-engineering/slides/uml.pptx
+++ b/software-engineering/slides/uml.pptx
@@ -270,7 +270,7 @@
           <a:p>
             <a:fld id="{9B5DFB4D-25A4-4008-8635-D2632B3E843C}" type="datetimeFigureOut">
               <a:rPr lang="en-US" smtClean="0"/>
-              <a:t>2/3/2019</a:t>
+              <a:t>1/13/2020</a:t>
             </a:fld>
             <a:endParaRPr lang="en-US"/>
           </a:p>
@@ -468,7 +468,7 @@
           <a:p>
             <a:fld id="{9B5DFB4D-25A4-4008-8635-D2632B3E843C}" type="datetimeFigureOut">
               <a:rPr lang="en-US" smtClean="0"/>
-              <a:t>2/3/2019</a:t>
+              <a:t>1/13/2020</a:t>
             </a:fld>
             <a:endParaRPr lang="en-US"/>
           </a:p>
@@ -676,7 +676,7 @@
           <a:p>
             <a:fld id="{9B5DFB4D-25A4-4008-8635-D2632B3E843C}" type="datetimeFigureOut">
               <a:rPr lang="en-US" smtClean="0"/>
-              <a:t>2/3/2019</a:t>
+              <a:t>1/13/2020</a:t>
             </a:fld>
             <a:endParaRPr lang="en-US"/>
           </a:p>
@@ -874,7 +874,7 @@
           <a:p>
             <a:fld id="{9B5DFB4D-25A4-4008-8635-D2632B3E843C}" type="datetimeFigureOut">
               <a:rPr lang="en-US" smtClean="0"/>
-              <a:t>2/3/2019</a:t>
+              <a:t>1/13/2020</a:t>
             </a:fld>
             <a:endParaRPr lang="en-US"/>
           </a:p>
@@ -1149,7 +1149,7 @@
           <a:p>
             <a:fld id="{9B5DFB4D-25A4-4008-8635-D2632B3E843C}" type="datetimeFigureOut">
               <a:rPr lang="en-US" smtClean="0"/>
-              <a:t>2/3/2019</a:t>
+              <a:t>1/13/2020</a:t>
             </a:fld>
             <a:endParaRPr lang="en-US"/>
           </a:p>
@@ -1414,7 +1414,7 @@
           <a:p>
             <a:fld id="{9B5DFB4D-25A4-4008-8635-D2632B3E843C}" type="datetimeFigureOut">
               <a:rPr lang="en-US" smtClean="0"/>
-              <a:t>2/3/2019</a:t>
+              <a:t>1/13/2020</a:t>
             </a:fld>
             <a:endParaRPr lang="en-US"/>
           </a:p>
@@ -1826,7 +1826,7 @@
           <a:p>
             <a:fld id="{9B5DFB4D-25A4-4008-8635-D2632B3E843C}" type="datetimeFigureOut">
               <a:rPr lang="en-US" smtClean="0"/>
-              <a:t>2/3/2019</a:t>
+              <a:t>1/13/2020</a:t>
             </a:fld>
             <a:endParaRPr lang="en-US"/>
           </a:p>
@@ -1967,7 +1967,7 @@
           <a:p>
             <a:fld id="{9B5DFB4D-25A4-4008-8635-D2632B3E843C}" type="datetimeFigureOut">
               <a:rPr lang="en-US" smtClean="0"/>
-              <a:t>2/3/2019</a:t>
+              <a:t>1/13/2020</a:t>
             </a:fld>
             <a:endParaRPr lang="en-US"/>
           </a:p>
@@ -2080,7 +2080,7 @@
           <a:p>
             <a:fld id="{9B5DFB4D-25A4-4008-8635-D2632B3E843C}" type="datetimeFigureOut">
               <a:rPr lang="en-US" smtClean="0"/>
-              <a:t>2/3/2019</a:t>
+              <a:t>1/13/2020</a:t>
             </a:fld>
             <a:endParaRPr lang="en-US"/>
           </a:p>
@@ -2391,7 +2391,7 @@
           <a:p>
             <a:fld id="{9B5DFB4D-25A4-4008-8635-D2632B3E843C}" type="datetimeFigureOut">
               <a:rPr lang="en-US" smtClean="0"/>
-              <a:t>2/3/2019</a:t>
+              <a:t>1/13/2020</a:t>
             </a:fld>
             <a:endParaRPr lang="en-US"/>
           </a:p>
@@ -2679,7 +2679,7 @@
           <a:p>
             <a:fld id="{9B5DFB4D-25A4-4008-8635-D2632B3E843C}" type="datetimeFigureOut">
               <a:rPr lang="en-US" smtClean="0"/>
-              <a:t>2/3/2019</a:t>
+              <a:t>1/13/2020</a:t>
             </a:fld>
             <a:endParaRPr lang="en-US"/>
           </a:p>
@@ -2920,7 +2920,7 @@
           <a:p>
             <a:fld id="{9B5DFB4D-25A4-4008-8635-D2632B3E843C}" type="datetimeFigureOut">
               <a:rPr lang="en-US" smtClean="0"/>
-              <a:t>2/3/2019</a:t>
+              <a:t>1/13/2020</a:t>
             </a:fld>
             <a:endParaRPr lang="en-US"/>
           </a:p>
@@ -3392,7 +3392,7 @@
             </a:ln>
             <a:extLst>
               <a:ext uri="{909E8E84-426E-40dd-AFC4-6F175D3DCCD1}">
-                <a14:hiddenFill xmlns="" xmlns:a14="http://schemas.microsoft.com/office/drawing/2010/main">
+                <a14:hiddenFill xmlns:a14="http://schemas.microsoft.com/office/drawing/2010/main" xmlns="">
                   <a:solidFill>
                     <a:srgbClr val="FFFFFF"/>
                   </a:solidFill>
@@ -3551,7 +3551,7 @@
             </a:ln>
             <a:extLst>
               <a:ext uri="{909E8E84-426E-40dd-AFC4-6F175D3DCCD1}">
-                <a14:hiddenFill xmlns="" xmlns:a14="http://schemas.microsoft.com/office/drawing/2010/main">
+                <a14:hiddenFill xmlns:a14="http://schemas.microsoft.com/office/drawing/2010/main" xmlns="">
                   <a:noFill/>
                 </a14:hiddenFill>
               </a:ext>
@@ -3598,7 +3598,7 @@
             </a:ln>
             <a:extLst>
               <a:ext uri="{909E8E84-426E-40dd-AFC4-6F175D3DCCD1}">
-                <a14:hiddenFill xmlns="" xmlns:a14="http://schemas.microsoft.com/office/drawing/2010/main">
+                <a14:hiddenFill xmlns:a14="http://schemas.microsoft.com/office/drawing/2010/main" xmlns="">
                   <a:noFill/>
                 </a14:hiddenFill>
               </a:ext>
@@ -3645,7 +3645,7 @@
             </a:ln>
             <a:extLst>
               <a:ext uri="{909E8E84-426E-40dd-AFC4-6F175D3DCCD1}">
-                <a14:hiddenFill xmlns="" xmlns:a14="http://schemas.microsoft.com/office/drawing/2010/main">
+                <a14:hiddenFill xmlns:a14="http://schemas.microsoft.com/office/drawing/2010/main" xmlns="">
                   <a:noFill/>
                 </a14:hiddenFill>
               </a:ext>
@@ -3692,7 +3692,7 @@
             </a:ln>
             <a:extLst>
               <a:ext uri="{909E8E84-426E-40dd-AFC4-6F175D3DCCD1}">
-                <a14:hiddenFill xmlns="" xmlns:a14="http://schemas.microsoft.com/office/drawing/2010/main">
+                <a14:hiddenFill xmlns:a14="http://schemas.microsoft.com/office/drawing/2010/main" xmlns="">
                   <a:noFill/>
                 </a14:hiddenFill>
               </a:ext>
@@ -3735,14 +3735,14 @@
           </a:ln>
           <a:extLst>
             <a:ext uri="{909E8E84-426E-40dd-AFC4-6F175D3DCCD1}">
-              <a14:hiddenFill xmlns="" xmlns:a14="http://schemas.microsoft.com/office/drawing/2010/main">
+              <a14:hiddenFill xmlns:a14="http://schemas.microsoft.com/office/drawing/2010/main" xmlns="">
                 <a:solidFill>
                   <a:srgbClr val="FFFFFF"/>
                 </a:solidFill>
               </a14:hiddenFill>
             </a:ext>
             <a:ext uri="{91240B29-F687-4f45-9708-019B960494DF}">
-              <a14:hiddenLine xmlns="" xmlns:a14="http://schemas.microsoft.com/office/drawing/2010/main" w="9525">
+              <a14:hiddenLine xmlns:a14="http://schemas.microsoft.com/office/drawing/2010/main" xmlns="" w="9525">
                 <a:solidFill>
                   <a:srgbClr val="000000"/>
                 </a:solidFill>
@@ -3918,7 +3918,7 @@
           </a:ln>
           <a:extLst>
             <a:ext uri="{909E8E84-426E-40dd-AFC4-6F175D3DCCD1}">
-              <a14:hiddenFill xmlns="" xmlns:a14="http://schemas.microsoft.com/office/drawing/2010/main">
+              <a14:hiddenFill xmlns:a14="http://schemas.microsoft.com/office/drawing/2010/main" xmlns="">
                 <a:solidFill>
                   <a:srgbClr val="FFFFFF"/>
                 </a:solidFill>
@@ -4077,7 +4077,7 @@
           </a:ln>
           <a:extLst>
             <a:ext uri="{909E8E84-426E-40dd-AFC4-6F175D3DCCD1}">
-              <a14:hiddenFill xmlns="" xmlns:a14="http://schemas.microsoft.com/office/drawing/2010/main">
+              <a14:hiddenFill xmlns:a14="http://schemas.microsoft.com/office/drawing/2010/main" xmlns="">
                 <a:noFill/>
               </a14:hiddenFill>
             </a:ext>
@@ -4419,7 +4419,7 @@
           </a:ln>
           <a:extLst>
             <a:ext uri="{909E8E84-426E-40dd-AFC4-6F175D3DCCD1}">
-              <a14:hiddenFill xmlns="" xmlns:a14="http://schemas.microsoft.com/office/drawing/2010/main">
+              <a14:hiddenFill xmlns:a14="http://schemas.microsoft.com/office/drawing/2010/main" xmlns="">
                 <a:noFill/>
               </a14:hiddenFill>
             </a:ext>
@@ -4466,7 +4466,7 @@
           </a:ln>
           <a:extLst>
             <a:ext uri="{909E8E84-426E-40dd-AFC4-6F175D3DCCD1}">
-              <a14:hiddenFill xmlns="" xmlns:a14="http://schemas.microsoft.com/office/drawing/2010/main">
+              <a14:hiddenFill xmlns:a14="http://schemas.microsoft.com/office/drawing/2010/main" xmlns="">
                 <a:noFill/>
               </a14:hiddenFill>
             </a:ext>
@@ -4513,7 +4513,7 @@
           </a:ln>
           <a:extLst>
             <a:ext uri="{909E8E84-426E-40dd-AFC4-6F175D3DCCD1}">
-              <a14:hiddenFill xmlns="" xmlns:a14="http://schemas.microsoft.com/office/drawing/2010/main">
+              <a14:hiddenFill xmlns:a14="http://schemas.microsoft.com/office/drawing/2010/main" xmlns="">
                 <a:noFill/>
               </a14:hiddenFill>
             </a:ext>
@@ -4582,7 +4582,7 @@
             </a:ln>
             <a:extLst>
               <a:ext uri="{909E8E84-426E-40dd-AFC4-6F175D3DCCD1}">
-                <a14:hiddenFill xmlns="" xmlns:a14="http://schemas.microsoft.com/office/drawing/2010/main">
+                <a14:hiddenFill xmlns:a14="http://schemas.microsoft.com/office/drawing/2010/main" xmlns="">
                   <a:solidFill>
                     <a:srgbClr val="FFFFFF"/>
                   </a:solidFill>
@@ -4741,7 +4741,7 @@
             </a:ln>
             <a:extLst>
               <a:ext uri="{909E8E84-426E-40dd-AFC4-6F175D3DCCD1}">
-                <a14:hiddenFill xmlns="" xmlns:a14="http://schemas.microsoft.com/office/drawing/2010/main">
+                <a14:hiddenFill xmlns:a14="http://schemas.microsoft.com/office/drawing/2010/main" xmlns="">
                   <a:noFill/>
                 </a14:hiddenFill>
               </a:ext>
@@ -4788,7 +4788,7 @@
             </a:ln>
             <a:extLst>
               <a:ext uri="{909E8E84-426E-40dd-AFC4-6F175D3DCCD1}">
-                <a14:hiddenFill xmlns="" xmlns:a14="http://schemas.microsoft.com/office/drawing/2010/main">
+                <a14:hiddenFill xmlns:a14="http://schemas.microsoft.com/office/drawing/2010/main" xmlns="">
                   <a:noFill/>
                 </a14:hiddenFill>
               </a:ext>
@@ -4835,7 +4835,7 @@
             </a:ln>
             <a:extLst>
               <a:ext uri="{909E8E84-426E-40dd-AFC4-6F175D3DCCD1}">
-                <a14:hiddenFill xmlns="" xmlns:a14="http://schemas.microsoft.com/office/drawing/2010/main">
+                <a14:hiddenFill xmlns:a14="http://schemas.microsoft.com/office/drawing/2010/main" xmlns="">
                   <a:noFill/>
                 </a14:hiddenFill>
               </a:ext>
@@ -4882,7 +4882,7 @@
             </a:ln>
             <a:extLst>
               <a:ext uri="{909E8E84-426E-40dd-AFC4-6F175D3DCCD1}">
-                <a14:hiddenFill xmlns="" xmlns:a14="http://schemas.microsoft.com/office/drawing/2010/main">
+                <a14:hiddenFill xmlns:a14="http://schemas.microsoft.com/office/drawing/2010/main" xmlns="">
                   <a:noFill/>
                 </a14:hiddenFill>
               </a:ext>
@@ -4925,14 +4925,14 @@
           </a:ln>
           <a:extLst>
             <a:ext uri="{909E8E84-426E-40dd-AFC4-6F175D3DCCD1}">
-              <a14:hiddenFill xmlns="" xmlns:a14="http://schemas.microsoft.com/office/drawing/2010/main">
+              <a14:hiddenFill xmlns:a14="http://schemas.microsoft.com/office/drawing/2010/main" xmlns="">
                 <a:solidFill>
                   <a:srgbClr val="FFFFFF"/>
                 </a:solidFill>
               </a14:hiddenFill>
             </a:ext>
             <a:ext uri="{91240B29-F687-4f45-9708-019B960494DF}">
-              <a14:hiddenLine xmlns="" xmlns:a14="http://schemas.microsoft.com/office/drawing/2010/main" w="9525">
+              <a14:hiddenLine xmlns:a14="http://schemas.microsoft.com/office/drawing/2010/main" xmlns="" w="9525">
                 <a:solidFill>
                   <a:srgbClr val="000000"/>
                 </a:solidFill>
@@ -5108,7 +5108,7 @@
           </a:ln>
           <a:extLst>
             <a:ext uri="{909E8E84-426E-40dd-AFC4-6F175D3DCCD1}">
-              <a14:hiddenFill xmlns="" xmlns:a14="http://schemas.microsoft.com/office/drawing/2010/main">
+              <a14:hiddenFill xmlns:a14="http://schemas.microsoft.com/office/drawing/2010/main" xmlns="">
                 <a:noFill/>
               </a14:hiddenFill>
             </a:ext>
@@ -5155,7 +5155,7 @@
           </a:ln>
           <a:extLst>
             <a:ext uri="{909E8E84-426E-40dd-AFC4-6F175D3DCCD1}">
-              <a14:hiddenFill xmlns="" xmlns:a14="http://schemas.microsoft.com/office/drawing/2010/main">
+              <a14:hiddenFill xmlns:a14="http://schemas.microsoft.com/office/drawing/2010/main" xmlns="">
                 <a:noFill/>
               </a14:hiddenFill>
             </a:ext>
@@ -5202,7 +5202,7 @@
           </a:ln>
           <a:extLst>
             <a:ext uri="{909E8E84-426E-40dd-AFC4-6F175D3DCCD1}">
-              <a14:hiddenFill xmlns="" xmlns:a14="http://schemas.microsoft.com/office/drawing/2010/main">
+              <a14:hiddenFill xmlns:a14="http://schemas.microsoft.com/office/drawing/2010/main" xmlns="">
                 <a:noFill/>
               </a14:hiddenFill>
             </a:ext>
@@ -5362,7 +5362,7 @@
             </a:ln>
             <a:extLst>
               <a:ext uri="{909E8E84-426E-40dd-AFC4-6F175D3DCCD1}">
-                <a14:hiddenFill xmlns="" xmlns:a14="http://schemas.microsoft.com/office/drawing/2010/main">
+                <a14:hiddenFill xmlns:a14="http://schemas.microsoft.com/office/drawing/2010/main" xmlns="">
                   <a:solidFill>
                     <a:srgbClr val="FFFFFF"/>
                   </a:solidFill>
@@ -5521,7 +5521,7 @@
             </a:ln>
             <a:extLst>
               <a:ext uri="{909E8E84-426E-40dd-AFC4-6F175D3DCCD1}">
-                <a14:hiddenFill xmlns="" xmlns:a14="http://schemas.microsoft.com/office/drawing/2010/main">
+                <a14:hiddenFill xmlns:a14="http://schemas.microsoft.com/office/drawing/2010/main" xmlns="">
                   <a:noFill/>
                 </a14:hiddenFill>
               </a:ext>
@@ -5568,7 +5568,7 @@
             </a:ln>
             <a:extLst>
               <a:ext uri="{909E8E84-426E-40dd-AFC4-6F175D3DCCD1}">
-                <a14:hiddenFill xmlns="" xmlns:a14="http://schemas.microsoft.com/office/drawing/2010/main">
+                <a14:hiddenFill xmlns:a14="http://schemas.microsoft.com/office/drawing/2010/main" xmlns="">
                   <a:noFill/>
                 </a14:hiddenFill>
               </a:ext>
@@ -5615,7 +5615,7 @@
             </a:ln>
             <a:extLst>
               <a:ext uri="{909E8E84-426E-40dd-AFC4-6F175D3DCCD1}">
-                <a14:hiddenFill xmlns="" xmlns:a14="http://schemas.microsoft.com/office/drawing/2010/main">
+                <a14:hiddenFill xmlns:a14="http://schemas.microsoft.com/office/drawing/2010/main" xmlns="">
                   <a:noFill/>
                 </a14:hiddenFill>
               </a:ext>
@@ -5662,7 +5662,7 @@
             </a:ln>
             <a:extLst>
               <a:ext uri="{909E8E84-426E-40dd-AFC4-6F175D3DCCD1}">
-                <a14:hiddenFill xmlns="" xmlns:a14="http://schemas.microsoft.com/office/drawing/2010/main">
+                <a14:hiddenFill xmlns:a14="http://schemas.microsoft.com/office/drawing/2010/main" xmlns="">
                   <a:noFill/>
                 </a14:hiddenFill>
               </a:ext>
@@ -5705,14 +5705,14 @@
           </a:ln>
           <a:extLst>
             <a:ext uri="{909E8E84-426E-40dd-AFC4-6F175D3DCCD1}">
-              <a14:hiddenFill xmlns="" xmlns:a14="http://schemas.microsoft.com/office/drawing/2010/main">
+              <a14:hiddenFill xmlns:a14="http://schemas.microsoft.com/office/drawing/2010/main" xmlns="">
                 <a:solidFill>
                   <a:srgbClr val="FFFFFF"/>
                 </a:solidFill>
               </a14:hiddenFill>
             </a:ext>
             <a:ext uri="{91240B29-F687-4f45-9708-019B960494DF}">
-              <a14:hiddenLine xmlns="" xmlns:a14="http://schemas.microsoft.com/office/drawing/2010/main" w="9525">
+              <a14:hiddenLine xmlns:a14="http://schemas.microsoft.com/office/drawing/2010/main" xmlns="" w="9525">
                 <a:solidFill>
                   <a:srgbClr val="000000"/>
                 </a:solidFill>
@@ -6714,14 +6714,14 @@
           </a:ln>
           <a:extLst>
             <a:ext uri="{909E8E84-426E-40dd-AFC4-6F175D3DCCD1}">
-              <a14:hiddenFill xmlns="" xmlns:a14="http://schemas.microsoft.com/office/drawing/2010/main">
+              <a14:hiddenFill xmlns:a14="http://schemas.microsoft.com/office/drawing/2010/main" xmlns="">
                 <a:solidFill>
                   <a:srgbClr val="FFFFFF"/>
                 </a:solidFill>
               </a14:hiddenFill>
             </a:ext>
             <a:ext uri="{91240B29-F687-4f45-9708-019B960494DF}">
-              <a14:hiddenLine xmlns="" xmlns:a14="http://schemas.microsoft.com/office/drawing/2010/main" w="9525">
+              <a14:hiddenLine xmlns:a14="http://schemas.microsoft.com/office/drawing/2010/main" xmlns="" w="9525">
                 <a:solidFill>
                   <a:srgbClr val="000000"/>
                 </a:solidFill>
@@ -6898,14 +6898,14 @@
           </a:ln>
           <a:extLst>
             <a:ext uri="{909E8E84-426E-40dd-AFC4-6F175D3DCCD1}">
-              <a14:hiddenFill xmlns="" xmlns:a14="http://schemas.microsoft.com/office/drawing/2010/main">
+              <a14:hiddenFill xmlns:a14="http://schemas.microsoft.com/office/drawing/2010/main" xmlns="">
                 <a:solidFill>
                   <a:srgbClr val="FFFFFF"/>
                 </a:solidFill>
               </a14:hiddenFill>
             </a:ext>
             <a:ext uri="{91240B29-F687-4f45-9708-019B960494DF}">
-              <a14:hiddenLine xmlns="" xmlns:a14="http://schemas.microsoft.com/office/drawing/2010/main" w="9525">
+              <a14:hiddenLine xmlns:a14="http://schemas.microsoft.com/office/drawing/2010/main" xmlns="" w="9525">
                 <a:solidFill>
                   <a:srgbClr val="000000"/>
                 </a:solidFill>
@@ -7082,14 +7082,14 @@
           </a:ln>
           <a:extLst>
             <a:ext uri="{909E8E84-426E-40dd-AFC4-6F175D3DCCD1}">
-              <a14:hiddenFill xmlns="" xmlns:a14="http://schemas.microsoft.com/office/drawing/2010/main">
+              <a14:hiddenFill xmlns:a14="http://schemas.microsoft.com/office/drawing/2010/main" xmlns="">
                 <a:solidFill>
                   <a:srgbClr val="FFFFFF"/>
                 </a:solidFill>
               </a14:hiddenFill>
             </a:ext>
             <a:ext uri="{91240B29-F687-4f45-9708-019B960494DF}">
-              <a14:hiddenLine xmlns="" xmlns:a14="http://schemas.microsoft.com/office/drawing/2010/main" w="9525">
+              <a14:hiddenLine xmlns:a14="http://schemas.microsoft.com/office/drawing/2010/main" xmlns="" w="9525">
                 <a:solidFill>
                   <a:srgbClr val="000000"/>
                 </a:solidFill>
@@ -7266,14 +7266,14 @@
           </a:ln>
           <a:extLst>
             <a:ext uri="{909E8E84-426E-40dd-AFC4-6F175D3DCCD1}">
-              <a14:hiddenFill xmlns="" xmlns:a14="http://schemas.microsoft.com/office/drawing/2010/main">
+              <a14:hiddenFill xmlns:a14="http://schemas.microsoft.com/office/drawing/2010/main" xmlns="">
                 <a:solidFill>
                   <a:srgbClr val="FFFFFF"/>
                 </a:solidFill>
               </a14:hiddenFill>
             </a:ext>
             <a:ext uri="{91240B29-F687-4f45-9708-019B960494DF}">
-              <a14:hiddenLine xmlns="" xmlns:a14="http://schemas.microsoft.com/office/drawing/2010/main" w="9525">
+              <a14:hiddenLine xmlns:a14="http://schemas.microsoft.com/office/drawing/2010/main" xmlns="" w="9525">
                 <a:solidFill>
                   <a:srgbClr val="000000"/>
                 </a:solidFill>
@@ -7450,14 +7450,14 @@
           </a:ln>
           <a:extLst>
             <a:ext uri="{909E8E84-426E-40dd-AFC4-6F175D3DCCD1}">
-              <a14:hiddenFill xmlns="" xmlns:a14="http://schemas.microsoft.com/office/drawing/2010/main">
+              <a14:hiddenFill xmlns:a14="http://schemas.microsoft.com/office/drawing/2010/main" xmlns="">
                 <a:solidFill>
                   <a:srgbClr val="FFFFFF"/>
                 </a:solidFill>
               </a14:hiddenFill>
             </a:ext>
             <a:ext uri="{91240B29-F687-4f45-9708-019B960494DF}">
-              <a14:hiddenLine xmlns="" xmlns:a14="http://schemas.microsoft.com/office/drawing/2010/main" w="9525">
+              <a14:hiddenLine xmlns:a14="http://schemas.microsoft.com/office/drawing/2010/main" xmlns="" w="9525">
                 <a:solidFill>
                   <a:srgbClr val="000000"/>
                 </a:solidFill>
@@ -7631,14 +7631,14 @@
           </a:ln>
           <a:extLst>
             <a:ext uri="{909E8E84-426E-40dd-AFC4-6F175D3DCCD1}">
-              <a14:hiddenFill xmlns="" xmlns:a14="http://schemas.microsoft.com/office/drawing/2010/main">
+              <a14:hiddenFill xmlns:a14="http://schemas.microsoft.com/office/drawing/2010/main" xmlns="">
                 <a:solidFill>
                   <a:srgbClr val="FFFFFF"/>
                 </a:solidFill>
               </a14:hiddenFill>
             </a:ext>
             <a:ext uri="{91240B29-F687-4f45-9708-019B960494DF}">
-              <a14:hiddenLine xmlns="" xmlns:a14="http://schemas.microsoft.com/office/drawing/2010/main" w="9525">
+              <a14:hiddenLine xmlns:a14="http://schemas.microsoft.com/office/drawing/2010/main" xmlns="" w="9525">
                 <a:solidFill>
                   <a:srgbClr val="000000"/>
                 </a:solidFill>
@@ -8995,14 +8995,14 @@
           </a:ln>
           <a:extLst>
             <a:ext uri="{909E8E84-426E-40dd-AFC4-6F175D3DCCD1}">
-              <a14:hiddenFill xmlns="" xmlns:a14="http://schemas.microsoft.com/office/drawing/2010/main">
+              <a14:hiddenFill xmlns:a14="http://schemas.microsoft.com/office/drawing/2010/main" xmlns="">
                 <a:solidFill>
                   <a:srgbClr val="FFFFFF"/>
                 </a:solidFill>
               </a14:hiddenFill>
             </a:ext>
             <a:ext uri="{91240B29-F687-4f45-9708-019B960494DF}">
-              <a14:hiddenLine xmlns="" xmlns:a14="http://schemas.microsoft.com/office/drawing/2010/main" w="9525">
+              <a14:hiddenLine xmlns:a14="http://schemas.microsoft.com/office/drawing/2010/main" xmlns="" w="9525">
                 <a:solidFill>
                   <a:srgbClr val="000000"/>
                 </a:solidFill>
@@ -9173,14 +9173,14 @@
           </a:ln>
           <a:extLst>
             <a:ext uri="{909E8E84-426E-40dd-AFC4-6F175D3DCCD1}">
-              <a14:hiddenFill xmlns="" xmlns:a14="http://schemas.microsoft.com/office/drawing/2010/main">
+              <a14:hiddenFill xmlns:a14="http://schemas.microsoft.com/office/drawing/2010/main" xmlns="">
                 <a:solidFill>
                   <a:srgbClr val="FFFFFF"/>
                 </a:solidFill>
               </a14:hiddenFill>
             </a:ext>
             <a:ext uri="{91240B29-F687-4f45-9708-019B960494DF}">
-              <a14:hiddenLine xmlns="" xmlns:a14="http://schemas.microsoft.com/office/drawing/2010/main" w="9525">
+              <a14:hiddenLine xmlns:a14="http://schemas.microsoft.com/office/drawing/2010/main" xmlns="" w="9525">
                 <a:solidFill>
                   <a:srgbClr val="000000"/>
                 </a:solidFill>
@@ -9351,14 +9351,14 @@
           </a:ln>
           <a:extLst>
             <a:ext uri="{909E8E84-426E-40dd-AFC4-6F175D3DCCD1}">
-              <a14:hiddenFill xmlns="" xmlns:a14="http://schemas.microsoft.com/office/drawing/2010/main">
+              <a14:hiddenFill xmlns:a14="http://schemas.microsoft.com/office/drawing/2010/main" xmlns="">
                 <a:solidFill>
                   <a:srgbClr val="FFFFFF"/>
                 </a:solidFill>
               </a14:hiddenFill>
             </a:ext>
             <a:ext uri="{91240B29-F687-4f45-9708-019B960494DF}">
-              <a14:hiddenLine xmlns="" xmlns:a14="http://schemas.microsoft.com/office/drawing/2010/main" w="9525">
+              <a14:hiddenLine xmlns:a14="http://schemas.microsoft.com/office/drawing/2010/main" xmlns="" w="9525">
                 <a:solidFill>
                   <a:srgbClr val="000000"/>
                 </a:solidFill>
@@ -9529,14 +9529,14 @@
           </a:ln>
           <a:extLst>
             <a:ext uri="{909E8E84-426E-40dd-AFC4-6F175D3DCCD1}">
-              <a14:hiddenFill xmlns="" xmlns:a14="http://schemas.microsoft.com/office/drawing/2010/main">
+              <a14:hiddenFill xmlns:a14="http://schemas.microsoft.com/office/drawing/2010/main" xmlns="">
                 <a:solidFill>
                   <a:srgbClr val="FFFFFF"/>
                 </a:solidFill>
               </a14:hiddenFill>
             </a:ext>
             <a:ext uri="{91240B29-F687-4f45-9708-019B960494DF}">
-              <a14:hiddenLine xmlns="" xmlns:a14="http://schemas.microsoft.com/office/drawing/2010/main" w="9525">
+              <a14:hiddenLine xmlns:a14="http://schemas.microsoft.com/office/drawing/2010/main" xmlns="" w="9525">
                 <a:solidFill>
                   <a:srgbClr val="000000"/>
                 </a:solidFill>
@@ -9707,14 +9707,14 @@
           </a:ln>
           <a:extLst>
             <a:ext uri="{909E8E84-426E-40dd-AFC4-6F175D3DCCD1}">
-              <a14:hiddenFill xmlns="" xmlns:a14="http://schemas.microsoft.com/office/drawing/2010/main">
+              <a14:hiddenFill xmlns:a14="http://schemas.microsoft.com/office/drawing/2010/main" xmlns="">
                 <a:solidFill>
                   <a:srgbClr val="FFFFFF"/>
                 </a:solidFill>
               </a14:hiddenFill>
             </a:ext>
             <a:ext uri="{91240B29-F687-4f45-9708-019B960494DF}">
-              <a14:hiddenLine xmlns="" xmlns:a14="http://schemas.microsoft.com/office/drawing/2010/main" w="9525">
+              <a14:hiddenLine xmlns:a14="http://schemas.microsoft.com/office/drawing/2010/main" xmlns="" w="9525">
                 <a:solidFill>
                   <a:srgbClr val="000000"/>
                 </a:solidFill>
@@ -10093,14 +10093,14 @@
           </a:ln>
           <a:extLst>
             <a:ext uri="{909E8E84-426E-40dd-AFC4-6F175D3DCCD1}">
-              <a14:hiddenFill xmlns="" xmlns:a14="http://schemas.microsoft.com/office/drawing/2010/main">
+              <a14:hiddenFill xmlns:a14="http://schemas.microsoft.com/office/drawing/2010/main" xmlns="">
                 <a:solidFill>
                   <a:srgbClr val="FFFFFF"/>
                 </a:solidFill>
               </a14:hiddenFill>
             </a:ext>
             <a:ext uri="{91240B29-F687-4f45-9708-019B960494DF}">
-              <a14:hiddenLine xmlns="" xmlns:a14="http://schemas.microsoft.com/office/drawing/2010/main" w="9525">
+              <a14:hiddenLine xmlns:a14="http://schemas.microsoft.com/office/drawing/2010/main" xmlns="" w="9525">
                 <a:solidFill>
                   <a:srgbClr val="000000"/>
                 </a:solidFill>
@@ -10411,14 +10411,14 @@
           </a:ln>
           <a:extLst>
             <a:ext uri="{909E8E84-426E-40dd-AFC4-6F175D3DCCD1}">
-              <a14:hiddenFill xmlns="" xmlns:a14="http://schemas.microsoft.com/office/drawing/2010/main">
+              <a14:hiddenFill xmlns:a14="http://schemas.microsoft.com/office/drawing/2010/main" xmlns="">
                 <a:solidFill>
                   <a:srgbClr val="FFFFFF"/>
                 </a:solidFill>
               </a14:hiddenFill>
             </a:ext>
             <a:ext uri="{91240B29-F687-4f45-9708-019B960494DF}">
-              <a14:hiddenLine xmlns="" xmlns:a14="http://schemas.microsoft.com/office/drawing/2010/main" w="9525">
+              <a14:hiddenLine xmlns:a14="http://schemas.microsoft.com/office/drawing/2010/main" xmlns="" w="9525">
                 <a:solidFill>
                   <a:srgbClr val="000000"/>
                 </a:solidFill>
@@ -10804,14 +10804,14 @@
           </a:ln>
           <a:extLst>
             <a:ext uri="{909E8E84-426E-40dd-AFC4-6F175D3DCCD1}">
-              <a14:hiddenFill xmlns="" xmlns:a14="http://schemas.microsoft.com/office/drawing/2010/main">
+              <a14:hiddenFill xmlns:a14="http://schemas.microsoft.com/office/drawing/2010/main" xmlns="">
                 <a:solidFill>
                   <a:srgbClr val="FFFFFF"/>
                 </a:solidFill>
               </a14:hiddenFill>
             </a:ext>
             <a:ext uri="{91240B29-F687-4f45-9708-019B960494DF}">
-              <a14:hiddenLine xmlns="" xmlns:a14="http://schemas.microsoft.com/office/drawing/2010/main" w="9525">
+              <a14:hiddenLine xmlns:a14="http://schemas.microsoft.com/office/drawing/2010/main" xmlns="" w="9525">
                 <a:solidFill>
                   <a:srgbClr val="000000"/>
                 </a:solidFill>
@@ -11026,14 +11026,14 @@
           </a:ln>
           <a:extLst>
             <a:ext uri="{909E8E84-426E-40dd-AFC4-6F175D3DCCD1}">
-              <a14:hiddenFill xmlns="" xmlns:a14="http://schemas.microsoft.com/office/drawing/2010/main">
+              <a14:hiddenFill xmlns:a14="http://schemas.microsoft.com/office/drawing/2010/main" xmlns="">
                 <a:solidFill>
                   <a:srgbClr val="FFFFFF"/>
                 </a:solidFill>
               </a14:hiddenFill>
             </a:ext>
             <a:ext uri="{91240B29-F687-4f45-9708-019B960494DF}">
-              <a14:hiddenLine xmlns="" xmlns:a14="http://schemas.microsoft.com/office/drawing/2010/main" w="9525">
+              <a14:hiddenLine xmlns:a14="http://schemas.microsoft.com/office/drawing/2010/main" xmlns="" w="9525">
                 <a:solidFill>
                   <a:srgbClr val="000000"/>
                 </a:solidFill>
@@ -11204,14 +11204,14 @@
           </a:ln>
           <a:extLst>
             <a:ext uri="{909E8E84-426E-40dd-AFC4-6F175D3DCCD1}">
-              <a14:hiddenFill xmlns="" xmlns:a14="http://schemas.microsoft.com/office/drawing/2010/main">
+              <a14:hiddenFill xmlns:a14="http://schemas.microsoft.com/office/drawing/2010/main" xmlns="">
                 <a:solidFill>
                   <a:srgbClr val="FFFFFF"/>
                 </a:solidFill>
               </a14:hiddenFill>
             </a:ext>
             <a:ext uri="{91240B29-F687-4f45-9708-019B960494DF}">
-              <a14:hiddenLine xmlns="" xmlns:a14="http://schemas.microsoft.com/office/drawing/2010/main" w="9525">
+              <a14:hiddenLine xmlns:a14="http://schemas.microsoft.com/office/drawing/2010/main" xmlns="" w="9525">
                 <a:solidFill>
                   <a:srgbClr val="000000"/>
                 </a:solidFill>
@@ -11442,14 +11442,14 @@
           </a:ln>
           <a:extLst>
             <a:ext uri="{909E8E84-426E-40dd-AFC4-6F175D3DCCD1}">
-              <a14:hiddenFill xmlns="" xmlns:a14="http://schemas.microsoft.com/office/drawing/2010/main">
+              <a14:hiddenFill xmlns:a14="http://schemas.microsoft.com/office/drawing/2010/main" xmlns="">
                 <a:solidFill>
                   <a:srgbClr val="FFFFFF"/>
                 </a:solidFill>
               </a14:hiddenFill>
             </a:ext>
             <a:ext uri="{91240B29-F687-4f45-9708-019B960494DF}">
-              <a14:hiddenLine xmlns="" xmlns:a14="http://schemas.microsoft.com/office/drawing/2010/main" w="9525">
+              <a14:hiddenLine xmlns:a14="http://schemas.microsoft.com/office/drawing/2010/main" xmlns="" w="9525">
                 <a:solidFill>
                   <a:srgbClr val="000000"/>
                 </a:solidFill>
@@ -11664,14 +11664,14 @@
           </a:ln>
           <a:extLst>
             <a:ext uri="{909E8E84-426E-40dd-AFC4-6F175D3DCCD1}">
-              <a14:hiddenFill xmlns="" xmlns:a14="http://schemas.microsoft.com/office/drawing/2010/main">
+              <a14:hiddenFill xmlns:a14="http://schemas.microsoft.com/office/drawing/2010/main" xmlns="">
                 <a:solidFill>
                   <a:srgbClr val="FFFFFF"/>
                 </a:solidFill>
               </a14:hiddenFill>
             </a:ext>
             <a:ext uri="{91240B29-F687-4f45-9708-019B960494DF}">
-              <a14:hiddenLine xmlns="" xmlns:a14="http://schemas.microsoft.com/office/drawing/2010/main" w="9525">
+              <a14:hiddenLine xmlns:a14="http://schemas.microsoft.com/office/drawing/2010/main" xmlns="" w="9525">
                 <a:solidFill>
                   <a:srgbClr val="000000"/>
                 </a:solidFill>
@@ -12066,14 +12066,14 @@
           </a:ln>
           <a:extLst>
             <a:ext uri="{909E8E84-426E-40dd-AFC4-6F175D3DCCD1}">
-              <a14:hiddenFill xmlns="" xmlns:a14="http://schemas.microsoft.com/office/drawing/2010/main">
+              <a14:hiddenFill xmlns:a14="http://schemas.microsoft.com/office/drawing/2010/main" xmlns="">
                 <a:solidFill>
                   <a:srgbClr val="FFFFFF"/>
                 </a:solidFill>
               </a14:hiddenFill>
             </a:ext>
             <a:ext uri="{91240B29-F687-4f45-9708-019B960494DF}">
-              <a14:hiddenLine xmlns="" xmlns:a14="http://schemas.microsoft.com/office/drawing/2010/main" w="9525">
+              <a14:hiddenLine xmlns:a14="http://schemas.microsoft.com/office/drawing/2010/main" xmlns="" w="9525">
                 <a:solidFill>
                   <a:srgbClr val="000000"/>
                 </a:solidFill>
@@ -12303,14 +12303,14 @@
           </a:ln>
           <a:extLst>
             <a:ext uri="{909E8E84-426E-40dd-AFC4-6F175D3DCCD1}">
-              <a14:hiddenFill xmlns="" xmlns:a14="http://schemas.microsoft.com/office/drawing/2010/main">
+              <a14:hiddenFill xmlns:a14="http://schemas.microsoft.com/office/drawing/2010/main" xmlns="">
                 <a:solidFill>
                   <a:srgbClr val="FFFFFF"/>
                 </a:solidFill>
               </a14:hiddenFill>
             </a:ext>
             <a:ext uri="{91240B29-F687-4f45-9708-019B960494DF}">
-              <a14:hiddenLine xmlns="" xmlns:a14="http://schemas.microsoft.com/office/drawing/2010/main" w="9525">
+              <a14:hiddenLine xmlns:a14="http://schemas.microsoft.com/office/drawing/2010/main" xmlns="" w="9525">
                 <a:solidFill>
                   <a:srgbClr val="000000"/>
                 </a:solidFill>
@@ -12510,7 +12510,7 @@
         </p:nvGrpSpPr>
         <p:grpSpPr bwMode="auto">
           <a:xfrm>
-            <a:off x="1227702" y="2687768"/>
+            <a:off x="3082620" y="4299503"/>
             <a:ext cx="417512" cy="725438"/>
             <a:chOff x="480" y="2640"/>
             <a:chExt cx="288" cy="576"/>
@@ -12549,7 +12549,7 @@
             </a:ln>
             <a:extLst>
               <a:ext uri="{909E8E84-426E-40dd-AFC4-6F175D3DCCD1}">
-                <a14:hiddenFill xmlns="" xmlns:a14="http://schemas.microsoft.com/office/drawing/2010/main">
+                <a14:hiddenFill xmlns:a14="http://schemas.microsoft.com/office/drawing/2010/main" xmlns="">
                   <a:solidFill>
                     <a:srgbClr val="FFFFFF"/>
                   </a:solidFill>
@@ -12708,7 +12708,7 @@
             </a:ln>
             <a:extLst>
               <a:ext uri="{909E8E84-426E-40dd-AFC4-6F175D3DCCD1}">
-                <a14:hiddenFill xmlns="" xmlns:a14="http://schemas.microsoft.com/office/drawing/2010/main">
+                <a14:hiddenFill xmlns:a14="http://schemas.microsoft.com/office/drawing/2010/main" xmlns="">
                   <a:noFill/>
                 </a14:hiddenFill>
               </a:ext>
@@ -12755,7 +12755,7 @@
             </a:ln>
             <a:extLst>
               <a:ext uri="{909E8E84-426E-40dd-AFC4-6F175D3DCCD1}">
-                <a14:hiddenFill xmlns="" xmlns:a14="http://schemas.microsoft.com/office/drawing/2010/main">
+                <a14:hiddenFill xmlns:a14="http://schemas.microsoft.com/office/drawing/2010/main" xmlns="">
                   <a:noFill/>
                 </a14:hiddenFill>
               </a:ext>
@@ -12802,7 +12802,7 @@
             </a:ln>
             <a:extLst>
               <a:ext uri="{909E8E84-426E-40dd-AFC4-6F175D3DCCD1}">
-                <a14:hiddenFill xmlns="" xmlns:a14="http://schemas.microsoft.com/office/drawing/2010/main">
+                <a14:hiddenFill xmlns:a14="http://schemas.microsoft.com/office/drawing/2010/main" xmlns="">
                   <a:noFill/>
                 </a14:hiddenFill>
               </a:ext>
@@ -12849,7 +12849,7 @@
             </a:ln>
             <a:extLst>
               <a:ext uri="{909E8E84-426E-40dd-AFC4-6F175D3DCCD1}">
-                <a14:hiddenFill xmlns="" xmlns:a14="http://schemas.microsoft.com/office/drawing/2010/main">
+                <a14:hiddenFill xmlns:a14="http://schemas.microsoft.com/office/drawing/2010/main" xmlns="">
                   <a:noFill/>
                 </a14:hiddenFill>
               </a:ext>
@@ -12880,7 +12880,7 @@
         </p:nvSpPr>
         <p:spPr bwMode="auto">
           <a:xfrm>
-            <a:off x="810188" y="3450791"/>
+            <a:off x="2665106" y="5062526"/>
             <a:ext cx="1252537" cy="338554"/>
           </a:xfrm>
           <a:prstGeom prst="rect">
@@ -12892,14 +12892,14 @@
           </a:ln>
           <a:extLst>
             <a:ext uri="{909E8E84-426E-40dd-AFC4-6F175D3DCCD1}">
-              <a14:hiddenFill xmlns="" xmlns:a14="http://schemas.microsoft.com/office/drawing/2010/main">
+              <a14:hiddenFill xmlns:a14="http://schemas.microsoft.com/office/drawing/2010/main" xmlns="">
                 <a:solidFill>
                   <a:srgbClr val="FFFFFF"/>
                 </a:solidFill>
               </a14:hiddenFill>
             </a:ext>
             <a:ext uri="{91240B29-F687-4f45-9708-019B960494DF}">
-              <a14:hiddenLine xmlns="" xmlns:a14="http://schemas.microsoft.com/office/drawing/2010/main" w="9525">
+              <a14:hiddenLine xmlns:a14="http://schemas.microsoft.com/office/drawing/2010/main" xmlns="" w="9525">
                 <a:solidFill>
                   <a:srgbClr val="000000"/>
                 </a:solidFill>
@@ -13175,9 +13175,9 @@
           <p:nvPr/>
         </p:nvSpPr>
         <p:spPr bwMode="auto">
-          <a:xfrm flipH="1" flipV="1">
-            <a:off x="1436455" y="1641147"/>
-            <a:ext cx="0" cy="785772"/>
+          <a:xfrm rot="5400000" flipH="1" flipV="1">
+            <a:off x="4973760" y="3787273"/>
+            <a:ext cx="0" cy="1749897"/>
           </a:xfrm>
           <a:prstGeom prst="line">
             <a:avLst/>
@@ -13193,7 +13193,7 @@
           </a:ln>
           <a:extLst>
             <a:ext uri="{909E8E84-426E-40dd-AFC4-6F175D3DCCD1}">
-              <a14:hiddenFill xmlns="" xmlns:a14="http://schemas.microsoft.com/office/drawing/2010/main">
+              <a14:hiddenFill xmlns:a14="http://schemas.microsoft.com/office/drawing/2010/main" xmlns="">
                 <a:noFill/>
               </a14:hiddenFill>
             </a:ext>
@@ -13203,7 +13203,7 @@
           <a:bodyPr/>
           <a:lstStyle/>
           <a:p>
-            <a:endParaRPr lang="en-GB"/>
+            <a:endParaRPr lang="en-GB" dirty="0"/>
           </a:p>
         </p:txBody>
       </p:sp>
@@ -13223,7 +13223,7 @@
         </p:nvGrpSpPr>
         <p:grpSpPr bwMode="auto">
           <a:xfrm>
-            <a:off x="1227702" y="383110"/>
+            <a:off x="6513514" y="4299502"/>
             <a:ext cx="417512" cy="725438"/>
             <a:chOff x="480" y="2640"/>
             <a:chExt cx="288" cy="576"/>
@@ -13262,7 +13262,7 @@
             </a:ln>
             <a:extLst>
               <a:ext uri="{909E8E84-426E-40dd-AFC4-6F175D3DCCD1}">
-                <a14:hiddenFill xmlns="" xmlns:a14="http://schemas.microsoft.com/office/drawing/2010/main">
+                <a14:hiddenFill xmlns:a14="http://schemas.microsoft.com/office/drawing/2010/main" xmlns="">
                   <a:solidFill>
                     <a:srgbClr val="FFFFFF"/>
                   </a:solidFill>
@@ -13421,7 +13421,7 @@
             </a:ln>
             <a:extLst>
               <a:ext uri="{909E8E84-426E-40dd-AFC4-6F175D3DCCD1}">
-                <a14:hiddenFill xmlns="" xmlns:a14="http://schemas.microsoft.com/office/drawing/2010/main">
+                <a14:hiddenFill xmlns:a14="http://schemas.microsoft.com/office/drawing/2010/main" xmlns="">
                   <a:noFill/>
                 </a14:hiddenFill>
               </a:ext>
@@ -13468,7 +13468,7 @@
             </a:ln>
             <a:extLst>
               <a:ext uri="{909E8E84-426E-40dd-AFC4-6F175D3DCCD1}">
-                <a14:hiddenFill xmlns="" xmlns:a14="http://schemas.microsoft.com/office/drawing/2010/main">
+                <a14:hiddenFill xmlns:a14="http://schemas.microsoft.com/office/drawing/2010/main" xmlns="">
                   <a:noFill/>
                 </a14:hiddenFill>
               </a:ext>
@@ -13515,7 +13515,7 @@
             </a:ln>
             <a:extLst>
               <a:ext uri="{909E8E84-426E-40dd-AFC4-6F175D3DCCD1}">
-                <a14:hiddenFill xmlns="" xmlns:a14="http://schemas.microsoft.com/office/drawing/2010/main">
+                <a14:hiddenFill xmlns:a14="http://schemas.microsoft.com/office/drawing/2010/main" xmlns="">
                   <a:noFill/>
                 </a14:hiddenFill>
               </a:ext>
@@ -13562,7 +13562,7 @@
             </a:ln>
             <a:extLst>
               <a:ext uri="{909E8E84-426E-40dd-AFC4-6F175D3DCCD1}">
-                <a14:hiddenFill xmlns="" xmlns:a14="http://schemas.microsoft.com/office/drawing/2010/main">
+                <a14:hiddenFill xmlns:a14="http://schemas.microsoft.com/office/drawing/2010/main" xmlns="">
                   <a:noFill/>
                 </a14:hiddenFill>
               </a:ext>
@@ -13593,7 +13593,7 @@
         </p:nvSpPr>
         <p:spPr bwMode="auto">
           <a:xfrm>
-            <a:off x="810188" y="1146133"/>
+            <a:off x="6096000" y="5062525"/>
             <a:ext cx="1252537" cy="338554"/>
           </a:xfrm>
           <a:prstGeom prst="rect">
@@ -13605,14 +13605,14 @@
           </a:ln>
           <a:extLst>
             <a:ext uri="{909E8E84-426E-40dd-AFC4-6F175D3DCCD1}">
-              <a14:hiddenFill xmlns="" xmlns:a14="http://schemas.microsoft.com/office/drawing/2010/main">
+              <a14:hiddenFill xmlns:a14="http://schemas.microsoft.com/office/drawing/2010/main" xmlns="">
                 <a:solidFill>
                   <a:srgbClr val="FFFFFF"/>
                 </a:solidFill>
               </a14:hiddenFill>
             </a:ext>
             <a:ext uri="{91240B29-F687-4f45-9708-019B960494DF}">
-              <a14:hiddenLine xmlns="" xmlns:a14="http://schemas.microsoft.com/office/drawing/2010/main" w="9525">
+              <a14:hiddenLine xmlns:a14="http://schemas.microsoft.com/office/drawing/2010/main" xmlns="" w="9525">
                 <a:solidFill>
                   <a:srgbClr val="000000"/>
                 </a:solidFill>
@@ -13768,8 +13768,8 @@
           <p:nvPr/>
         </p:nvSpPr>
         <p:spPr>
-          <a:xfrm>
-            <a:off x="1349292" y="1554859"/>
+          <a:xfrm rot="5400000">
+            <a:off x="5818747" y="4580251"/>
             <a:ext cx="174326" cy="163940"/>
           </a:xfrm>
           <a:prstGeom prst="triangle">
@@ -13842,7 +13842,7 @@
           </a:ln>
           <a:extLst>
             <a:ext uri="{909E8E84-426E-40dd-AFC4-6F175D3DCCD1}">
-              <a14:hiddenFill xmlns="" xmlns:a14="http://schemas.microsoft.com/office/drawing/2010/main">
+              <a14:hiddenFill xmlns:a14="http://schemas.microsoft.com/office/drawing/2010/main" xmlns="">
                 <a:noFill/>
               </a14:hiddenFill>
             </a:ext>
@@ -13964,7 +13964,7 @@
                   <a:schemeClr val="tx1"/>
                 </a:solidFill>
               </a:rPr>
-              <a:t>Login</a:t>
+              <a:t>Upload slides</a:t>
             </a:r>
           </a:p>
         </p:txBody>
@@ -14023,7 +14023,7 @@
                   <a:schemeClr val="tx1"/>
                 </a:solidFill>
               </a:rPr>
-              <a:t>Upload slides</a:t>
+              <a:t>Get help on uploading</a:t>
             </a:r>
           </a:p>
         </p:txBody>
@@ -14062,7 +14062,7 @@
           </a:ln>
           <a:extLst>
             <a:ext uri="{909E8E84-426E-40dd-AFC4-6F175D3DCCD1}">
-              <a14:hiddenFill xmlns="" xmlns:a14="http://schemas.microsoft.com/office/drawing/2010/main">
+              <a14:hiddenFill xmlns:a14="http://schemas.microsoft.com/office/drawing/2010/main" xmlns="">
                 <a:noFill/>
               </a14:hiddenFill>
             </a:ext>
@@ -14073,6 +14073,524 @@
           <a:lstStyle/>
           <a:p>
             <a:endParaRPr lang="en-GB"/>
+          </a:p>
+        </p:txBody>
+      </p:sp>
+      <p:sp>
+        <p:nvSpPr>
+          <p:cNvPr id="25" name="Oval 24">
+            <a:extLst>
+              <a:ext uri="{FF2B5EF4-FFF2-40B4-BE49-F238E27FC236}">
+                <a16:creationId xmlns:a16="http://schemas.microsoft.com/office/drawing/2014/main" id="{E88A89CE-2785-4DA7-A2C6-54B57BF7078B}"/>
+              </a:ext>
+            </a:extLst>
+          </p:cNvPr>
+          <p:cNvSpPr/>
+          <p:nvPr/>
+        </p:nvSpPr>
+        <p:spPr>
+          <a:xfrm>
+            <a:off x="6457594" y="745829"/>
+            <a:ext cx="1661310" cy="778097"/>
+          </a:xfrm>
+          <a:prstGeom prst="ellipse">
+            <a:avLst/>
+          </a:prstGeom>
+          <a:noFill/>
+          <a:ln w="19050">
+            <a:solidFill>
+              <a:schemeClr val="tx1"/>
+            </a:solidFill>
+          </a:ln>
+        </p:spPr>
+        <p:style>
+          <a:lnRef idx="2">
+            <a:schemeClr val="accent1">
+              <a:shade val="50000"/>
+            </a:schemeClr>
+          </a:lnRef>
+          <a:fillRef idx="1">
+            <a:schemeClr val="accent1"/>
+          </a:fillRef>
+          <a:effectRef idx="0">
+            <a:schemeClr val="accent1"/>
+          </a:effectRef>
+          <a:fontRef idx="minor">
+            <a:schemeClr val="lt1"/>
+          </a:fontRef>
+        </p:style>
+        <p:txBody>
+          <a:bodyPr rtlCol="0" anchor="ctr"/>
+          <a:lstStyle/>
+          <a:p>
+            <a:pPr algn="ctr"/>
+            <a:r>
+              <a:rPr lang="en-US" sz="1400" dirty="0">
+                <a:solidFill>
+                  <a:schemeClr val="tx1"/>
+                </a:solidFill>
+              </a:rPr>
+              <a:t>Login</a:t>
+            </a:r>
+          </a:p>
+        </p:txBody>
+      </p:sp>
+      <p:sp>
+        <p:nvSpPr>
+          <p:cNvPr id="26" name="Oval 25">
+            <a:extLst>
+              <a:ext uri="{FF2B5EF4-FFF2-40B4-BE49-F238E27FC236}">
+                <a16:creationId xmlns:a16="http://schemas.microsoft.com/office/drawing/2014/main" id="{0F08A9EB-6D94-4FA4-9F76-19015D3C426F}"/>
+              </a:ext>
+            </a:extLst>
+          </p:cNvPr>
+          <p:cNvSpPr/>
+          <p:nvPr/>
+        </p:nvSpPr>
+        <p:spPr>
+          <a:xfrm>
+            <a:off x="6490645" y="2419227"/>
+            <a:ext cx="1661311" cy="778097"/>
+          </a:xfrm>
+          <a:prstGeom prst="ellipse">
+            <a:avLst/>
+          </a:prstGeom>
+          <a:noFill/>
+          <a:ln w="19050">
+            <a:solidFill>
+              <a:schemeClr val="tx1"/>
+            </a:solidFill>
+          </a:ln>
+        </p:spPr>
+        <p:style>
+          <a:lnRef idx="2">
+            <a:schemeClr val="accent1">
+              <a:shade val="50000"/>
+            </a:schemeClr>
+          </a:lnRef>
+          <a:fillRef idx="1">
+            <a:schemeClr val="accent1"/>
+          </a:fillRef>
+          <a:effectRef idx="0">
+            <a:schemeClr val="accent1"/>
+          </a:effectRef>
+          <a:fontRef idx="minor">
+            <a:schemeClr val="lt1"/>
+          </a:fontRef>
+        </p:style>
+        <p:txBody>
+          <a:bodyPr rtlCol="0" anchor="ctr"/>
+          <a:lstStyle/>
+          <a:p>
+            <a:pPr algn="ctr"/>
+            <a:r>
+              <a:rPr lang="en-US" sz="1400" dirty="0">
+                <a:solidFill>
+                  <a:schemeClr val="tx1"/>
+                </a:solidFill>
+              </a:rPr>
+              <a:t>Upload slides</a:t>
+            </a:r>
+          </a:p>
+        </p:txBody>
+      </p:sp>
+      <p:sp>
+        <p:nvSpPr>
+          <p:cNvPr id="27" name="Line 26">
+            <a:extLst>
+              <a:ext uri="{FF2B5EF4-FFF2-40B4-BE49-F238E27FC236}">
+                <a16:creationId xmlns:a16="http://schemas.microsoft.com/office/drawing/2014/main" id="{1D7DA5B1-B786-4844-BE96-04600AEBBEC6}"/>
+              </a:ext>
+            </a:extLst>
+          </p:cNvPr>
+          <p:cNvSpPr>
+            <a:spLocks noChangeShapeType="1"/>
+          </p:cNvSpPr>
+          <p:nvPr/>
+        </p:nvSpPr>
+        <p:spPr bwMode="auto">
+          <a:xfrm flipH="1" flipV="1">
+            <a:off x="7288250" y="1523926"/>
+            <a:ext cx="0" cy="902993"/>
+          </a:xfrm>
+          <a:prstGeom prst="line">
+            <a:avLst/>
+          </a:prstGeom>
+          <a:noFill/>
+          <a:ln w="19050">
+            <a:solidFill>
+              <a:schemeClr val="tx1"/>
+            </a:solidFill>
+            <a:prstDash val="sysDot"/>
+            <a:round/>
+            <a:headEnd type="none"/>
+            <a:tailEnd type="arrow" w="lg" len="lg"/>
+          </a:ln>
+          <a:extLst>
+            <a:ext uri="{909E8E84-426E-40dd-AFC4-6F175D3DCCD1}">
+              <a14:hiddenFill xmlns:a14="http://schemas.microsoft.com/office/drawing/2010/main" xmlns="">
+                <a:noFill/>
+              </a14:hiddenFill>
+            </a:ext>
+          </a:extLst>
+        </p:spPr>
+        <p:txBody>
+          <a:bodyPr/>
+          <a:lstStyle/>
+          <a:p>
+            <a:endParaRPr lang="en-GB"/>
+          </a:p>
+        </p:txBody>
+      </p:sp>
+      <p:sp>
+        <p:nvSpPr>
+          <p:cNvPr id="28" name="Text Box 25">
+            <a:extLst>
+              <a:ext uri="{FF2B5EF4-FFF2-40B4-BE49-F238E27FC236}">
+                <a16:creationId xmlns:a16="http://schemas.microsoft.com/office/drawing/2014/main" id="{64993DEC-9091-4F3A-B949-DFF4D51E4122}"/>
+              </a:ext>
+            </a:extLst>
+          </p:cNvPr>
+          <p:cNvSpPr txBox="1">
+            <a:spLocks noChangeArrowheads="1"/>
+          </p:cNvSpPr>
+          <p:nvPr/>
+        </p:nvSpPr>
+        <p:spPr bwMode="auto">
+          <a:xfrm>
+            <a:off x="5080314" y="1808743"/>
+            <a:ext cx="1252537" cy="338554"/>
+          </a:xfrm>
+          <a:prstGeom prst="rect">
+            <a:avLst/>
+          </a:prstGeom>
+          <a:noFill/>
+          <a:ln>
+            <a:noFill/>
+          </a:ln>
+          <a:extLst>
+            <a:ext uri="{909E8E84-426E-40dd-AFC4-6F175D3DCCD1}">
+              <a14:hiddenFill xmlns:a14="http://schemas.microsoft.com/office/drawing/2010/main" xmlns="">
+                <a:solidFill>
+                  <a:srgbClr val="FFFFFF"/>
+                </a:solidFill>
+              </a14:hiddenFill>
+            </a:ext>
+            <a:ext uri="{91240B29-F687-4f45-9708-019B960494DF}">
+              <a14:hiddenLine xmlns:a14="http://schemas.microsoft.com/office/drawing/2010/main" xmlns="" w="9525">
+                <a:solidFill>
+                  <a:srgbClr val="000000"/>
+                </a:solidFill>
+                <a:miter lim="800000"/>
+                <a:headEnd/>
+                <a:tailEnd/>
+              </a14:hiddenLine>
+            </a:ext>
+          </a:extLst>
+        </p:spPr>
+        <p:txBody>
+          <a:bodyPr>
+            <a:spAutoFit/>
+          </a:bodyPr>
+          <a:lstStyle>
+            <a:lvl1pPr>
+              <a:defRPr sz="2400">
+                <a:solidFill>
+                  <a:schemeClr val="tx1"/>
+                </a:solidFill>
+                <a:latin typeface="Times New Roman" panose="02020603050405020304" pitchFamily="18" charset="0"/>
+                <a:ea typeface="MS PGothic" panose="020B0600070205080204" pitchFamily="34" charset="-128"/>
+              </a:defRPr>
+            </a:lvl1pPr>
+            <a:lvl2pPr marL="742950" indent="-285750">
+              <a:defRPr sz="2400">
+                <a:solidFill>
+                  <a:schemeClr val="tx1"/>
+                </a:solidFill>
+                <a:latin typeface="Times New Roman" panose="02020603050405020304" pitchFamily="18" charset="0"/>
+                <a:ea typeface="MS PGothic" panose="020B0600070205080204" pitchFamily="34" charset="-128"/>
+              </a:defRPr>
+            </a:lvl2pPr>
+            <a:lvl3pPr marL="1143000" indent="-228600">
+              <a:defRPr sz="2400">
+                <a:solidFill>
+                  <a:schemeClr val="tx1"/>
+                </a:solidFill>
+                <a:latin typeface="Times New Roman" panose="02020603050405020304" pitchFamily="18" charset="0"/>
+                <a:ea typeface="MS PGothic" panose="020B0600070205080204" pitchFamily="34" charset="-128"/>
+              </a:defRPr>
+            </a:lvl3pPr>
+            <a:lvl4pPr marL="1600200" indent="-228600">
+              <a:defRPr sz="2400">
+                <a:solidFill>
+                  <a:schemeClr val="tx1"/>
+                </a:solidFill>
+                <a:latin typeface="Times New Roman" panose="02020603050405020304" pitchFamily="18" charset="0"/>
+                <a:ea typeface="MS PGothic" panose="020B0600070205080204" pitchFamily="34" charset="-128"/>
+              </a:defRPr>
+            </a:lvl4pPr>
+            <a:lvl5pPr marL="2057400" indent="-228600">
+              <a:defRPr sz="2400">
+                <a:solidFill>
+                  <a:schemeClr val="tx1"/>
+                </a:solidFill>
+                <a:latin typeface="Times New Roman" panose="02020603050405020304" pitchFamily="18" charset="0"/>
+                <a:ea typeface="MS PGothic" panose="020B0600070205080204" pitchFamily="34" charset="-128"/>
+              </a:defRPr>
+            </a:lvl5pPr>
+            <a:lvl6pPr marL="2514600" indent="-228600" algn="r" eaLnBrk="0" fontAlgn="base" hangingPunct="0">
+              <a:spcBef>
+                <a:spcPct val="0"/>
+              </a:spcBef>
+              <a:spcAft>
+                <a:spcPct val="0"/>
+              </a:spcAft>
+              <a:buChar char="•"/>
+              <a:defRPr sz="2400">
+                <a:solidFill>
+                  <a:schemeClr val="tx1"/>
+                </a:solidFill>
+                <a:latin typeface="Times New Roman" panose="02020603050405020304" pitchFamily="18" charset="0"/>
+                <a:ea typeface="MS PGothic" panose="020B0600070205080204" pitchFamily="34" charset="-128"/>
+              </a:defRPr>
+            </a:lvl6pPr>
+            <a:lvl7pPr marL="2971800" indent="-228600" algn="r" eaLnBrk="0" fontAlgn="base" hangingPunct="0">
+              <a:spcBef>
+                <a:spcPct val="0"/>
+              </a:spcBef>
+              <a:spcAft>
+                <a:spcPct val="0"/>
+              </a:spcAft>
+              <a:buChar char="•"/>
+              <a:defRPr sz="2400">
+                <a:solidFill>
+                  <a:schemeClr val="tx1"/>
+                </a:solidFill>
+                <a:latin typeface="Times New Roman" panose="02020603050405020304" pitchFamily="18" charset="0"/>
+                <a:ea typeface="MS PGothic" panose="020B0600070205080204" pitchFamily="34" charset="-128"/>
+              </a:defRPr>
+            </a:lvl7pPr>
+            <a:lvl8pPr marL="3429000" indent="-228600" algn="r" eaLnBrk="0" fontAlgn="base" hangingPunct="0">
+              <a:spcBef>
+                <a:spcPct val="0"/>
+              </a:spcBef>
+              <a:spcAft>
+                <a:spcPct val="0"/>
+              </a:spcAft>
+              <a:buChar char="•"/>
+              <a:defRPr sz="2400">
+                <a:solidFill>
+                  <a:schemeClr val="tx1"/>
+                </a:solidFill>
+                <a:latin typeface="Times New Roman" panose="02020603050405020304" pitchFamily="18" charset="0"/>
+                <a:ea typeface="MS PGothic" panose="020B0600070205080204" pitchFamily="34" charset="-128"/>
+              </a:defRPr>
+            </a:lvl8pPr>
+            <a:lvl9pPr marL="3886200" indent="-228600" algn="r" eaLnBrk="0" fontAlgn="base" hangingPunct="0">
+              <a:spcBef>
+                <a:spcPct val="0"/>
+              </a:spcBef>
+              <a:spcAft>
+                <a:spcPct val="0"/>
+              </a:spcAft>
+              <a:buChar char="•"/>
+              <a:defRPr sz="2400">
+                <a:solidFill>
+                  <a:schemeClr val="tx1"/>
+                </a:solidFill>
+                <a:latin typeface="Times New Roman" panose="02020603050405020304" pitchFamily="18" charset="0"/>
+                <a:ea typeface="MS PGothic" panose="020B0600070205080204" pitchFamily="34" charset="-128"/>
+              </a:defRPr>
+            </a:lvl9pPr>
+          </a:lstStyle>
+          <a:p>
+            <a:pPr algn="ctr">
+              <a:spcBef>
+                <a:spcPct val="50000"/>
+              </a:spcBef>
+            </a:pPr>
+            <a:r>
+              <a:rPr lang="en-GB" sz="1600" dirty="0">
+                <a:latin typeface="+mn-lt"/>
+              </a:rPr>
+              <a:t>«extend»</a:t>
+            </a:r>
+          </a:p>
+        </p:txBody>
+      </p:sp>
+      <p:sp>
+        <p:nvSpPr>
+          <p:cNvPr id="29" name="Text Box 25">
+            <a:extLst>
+              <a:ext uri="{FF2B5EF4-FFF2-40B4-BE49-F238E27FC236}">
+                <a16:creationId xmlns:a16="http://schemas.microsoft.com/office/drawing/2014/main" id="{9BD360B3-D2B8-4CD3-81E3-F1EB065DA787}"/>
+              </a:ext>
+            </a:extLst>
+          </p:cNvPr>
+          <p:cNvSpPr txBox="1">
+            <a:spLocks noChangeArrowheads="1"/>
+          </p:cNvSpPr>
+          <p:nvPr/>
+        </p:nvSpPr>
+        <p:spPr bwMode="auto">
+          <a:xfrm>
+            <a:off x="7193716" y="1808743"/>
+            <a:ext cx="1252537" cy="338554"/>
+          </a:xfrm>
+          <a:prstGeom prst="rect">
+            <a:avLst/>
+          </a:prstGeom>
+          <a:noFill/>
+          <a:ln>
+            <a:noFill/>
+          </a:ln>
+          <a:extLst>
+            <a:ext uri="{909E8E84-426E-40dd-AFC4-6F175D3DCCD1}">
+              <a14:hiddenFill xmlns:a14="http://schemas.microsoft.com/office/drawing/2010/main" xmlns="">
+                <a:solidFill>
+                  <a:srgbClr val="FFFFFF"/>
+                </a:solidFill>
+              </a14:hiddenFill>
+            </a:ext>
+            <a:ext uri="{91240B29-F687-4f45-9708-019B960494DF}">
+              <a14:hiddenLine xmlns:a14="http://schemas.microsoft.com/office/drawing/2010/main" xmlns="" w="9525">
+                <a:solidFill>
+                  <a:srgbClr val="000000"/>
+                </a:solidFill>
+                <a:miter lim="800000"/>
+                <a:headEnd/>
+                <a:tailEnd/>
+              </a14:hiddenLine>
+            </a:ext>
+          </a:extLst>
+        </p:spPr>
+        <p:txBody>
+          <a:bodyPr>
+            <a:spAutoFit/>
+          </a:bodyPr>
+          <a:lstStyle>
+            <a:lvl1pPr>
+              <a:defRPr sz="2400">
+                <a:solidFill>
+                  <a:schemeClr val="tx1"/>
+                </a:solidFill>
+                <a:latin typeface="Times New Roman" panose="02020603050405020304" pitchFamily="18" charset="0"/>
+                <a:ea typeface="MS PGothic" panose="020B0600070205080204" pitchFamily="34" charset="-128"/>
+              </a:defRPr>
+            </a:lvl1pPr>
+            <a:lvl2pPr marL="742950" indent="-285750">
+              <a:defRPr sz="2400">
+                <a:solidFill>
+                  <a:schemeClr val="tx1"/>
+                </a:solidFill>
+                <a:latin typeface="Times New Roman" panose="02020603050405020304" pitchFamily="18" charset="0"/>
+                <a:ea typeface="MS PGothic" panose="020B0600070205080204" pitchFamily="34" charset="-128"/>
+              </a:defRPr>
+            </a:lvl2pPr>
+            <a:lvl3pPr marL="1143000" indent="-228600">
+              <a:defRPr sz="2400">
+                <a:solidFill>
+                  <a:schemeClr val="tx1"/>
+                </a:solidFill>
+                <a:latin typeface="Times New Roman" panose="02020603050405020304" pitchFamily="18" charset="0"/>
+                <a:ea typeface="MS PGothic" panose="020B0600070205080204" pitchFamily="34" charset="-128"/>
+              </a:defRPr>
+            </a:lvl3pPr>
+            <a:lvl4pPr marL="1600200" indent="-228600">
+              <a:defRPr sz="2400">
+                <a:solidFill>
+                  <a:schemeClr val="tx1"/>
+                </a:solidFill>
+                <a:latin typeface="Times New Roman" panose="02020603050405020304" pitchFamily="18" charset="0"/>
+                <a:ea typeface="MS PGothic" panose="020B0600070205080204" pitchFamily="34" charset="-128"/>
+              </a:defRPr>
+            </a:lvl4pPr>
+            <a:lvl5pPr marL="2057400" indent="-228600">
+              <a:defRPr sz="2400">
+                <a:solidFill>
+                  <a:schemeClr val="tx1"/>
+                </a:solidFill>
+                <a:latin typeface="Times New Roman" panose="02020603050405020304" pitchFamily="18" charset="0"/>
+                <a:ea typeface="MS PGothic" panose="020B0600070205080204" pitchFamily="34" charset="-128"/>
+              </a:defRPr>
+            </a:lvl5pPr>
+            <a:lvl6pPr marL="2514600" indent="-228600" algn="r" eaLnBrk="0" fontAlgn="base" hangingPunct="0">
+              <a:spcBef>
+                <a:spcPct val="0"/>
+              </a:spcBef>
+              <a:spcAft>
+                <a:spcPct val="0"/>
+              </a:spcAft>
+              <a:buChar char="•"/>
+              <a:defRPr sz="2400">
+                <a:solidFill>
+                  <a:schemeClr val="tx1"/>
+                </a:solidFill>
+                <a:latin typeface="Times New Roman" panose="02020603050405020304" pitchFamily="18" charset="0"/>
+                <a:ea typeface="MS PGothic" panose="020B0600070205080204" pitchFamily="34" charset="-128"/>
+              </a:defRPr>
+            </a:lvl6pPr>
+            <a:lvl7pPr marL="2971800" indent="-228600" algn="r" eaLnBrk="0" fontAlgn="base" hangingPunct="0">
+              <a:spcBef>
+                <a:spcPct val="0"/>
+              </a:spcBef>
+              <a:spcAft>
+                <a:spcPct val="0"/>
+              </a:spcAft>
+              <a:buChar char="•"/>
+              <a:defRPr sz="2400">
+                <a:solidFill>
+                  <a:schemeClr val="tx1"/>
+                </a:solidFill>
+                <a:latin typeface="Times New Roman" panose="02020603050405020304" pitchFamily="18" charset="0"/>
+                <a:ea typeface="MS PGothic" panose="020B0600070205080204" pitchFamily="34" charset="-128"/>
+              </a:defRPr>
+            </a:lvl7pPr>
+            <a:lvl8pPr marL="3429000" indent="-228600" algn="r" eaLnBrk="0" fontAlgn="base" hangingPunct="0">
+              <a:spcBef>
+                <a:spcPct val="0"/>
+              </a:spcBef>
+              <a:spcAft>
+                <a:spcPct val="0"/>
+              </a:spcAft>
+              <a:buChar char="•"/>
+              <a:defRPr sz="2400">
+                <a:solidFill>
+                  <a:schemeClr val="tx1"/>
+                </a:solidFill>
+                <a:latin typeface="Times New Roman" panose="02020603050405020304" pitchFamily="18" charset="0"/>
+                <a:ea typeface="MS PGothic" panose="020B0600070205080204" pitchFamily="34" charset="-128"/>
+              </a:defRPr>
+            </a:lvl8pPr>
+            <a:lvl9pPr marL="3886200" indent="-228600" algn="r" eaLnBrk="0" fontAlgn="base" hangingPunct="0">
+              <a:spcBef>
+                <a:spcPct val="0"/>
+              </a:spcBef>
+              <a:spcAft>
+                <a:spcPct val="0"/>
+              </a:spcAft>
+              <a:buChar char="•"/>
+              <a:defRPr sz="2400">
+                <a:solidFill>
+                  <a:schemeClr val="tx1"/>
+                </a:solidFill>
+                <a:latin typeface="Times New Roman" panose="02020603050405020304" pitchFamily="18" charset="0"/>
+                <a:ea typeface="MS PGothic" panose="020B0600070205080204" pitchFamily="34" charset="-128"/>
+              </a:defRPr>
+            </a:lvl9pPr>
+          </a:lstStyle>
+          <a:p>
+            <a:pPr algn="ctr">
+              <a:spcBef>
+                <a:spcPct val="50000"/>
+              </a:spcBef>
+            </a:pPr>
+            <a:r>
+              <a:rPr lang="en-GB" sz="1600" dirty="0">
+                <a:latin typeface="+mn-lt"/>
+              </a:rPr>
+              <a:t>«include»</a:t>
+            </a:r>
           </a:p>
         </p:txBody>
       </p:sp>
@@ -14322,7 +14840,7 @@
           </a:ln>
           <a:extLst>
             <a:ext uri="{909E8E84-426E-40dd-AFC4-6F175D3DCCD1}">
-              <a14:hiddenFill xmlns="" xmlns:a14="http://schemas.microsoft.com/office/drawing/2010/main">
+              <a14:hiddenFill xmlns:a14="http://schemas.microsoft.com/office/drawing/2010/main" xmlns="">
                 <a:noFill/>
               </a14:hiddenFill>
             </a:ext>
@@ -14423,7 +14941,7 @@
           </a:ln>
           <a:extLst>
             <a:ext uri="{909E8E84-426E-40dd-AFC4-6F175D3DCCD1}">
-              <a14:hiddenFill xmlns="" xmlns:a14="http://schemas.microsoft.com/office/drawing/2010/main">
+              <a14:hiddenFill xmlns:a14="http://schemas.microsoft.com/office/drawing/2010/main" xmlns="">
                 <a:noFill/>
               </a14:hiddenFill>
             </a:ext>
@@ -14470,7 +14988,7 @@
           </a:ln>
           <a:extLst>
             <a:ext uri="{909E8E84-426E-40dd-AFC4-6F175D3DCCD1}">
-              <a14:hiddenFill xmlns="" xmlns:a14="http://schemas.microsoft.com/office/drawing/2010/main">
+              <a14:hiddenFill xmlns:a14="http://schemas.microsoft.com/office/drawing/2010/main" xmlns="">
                 <a:noFill/>
               </a14:hiddenFill>
             </a:ext>
@@ -14517,7 +15035,7 @@
           </a:ln>
           <a:extLst>
             <a:ext uri="{909E8E84-426E-40dd-AFC4-6F175D3DCCD1}">
-              <a14:hiddenFill xmlns="" xmlns:a14="http://schemas.microsoft.com/office/drawing/2010/main">
+              <a14:hiddenFill xmlns:a14="http://schemas.microsoft.com/office/drawing/2010/main" xmlns="">
                 <a:noFill/>
               </a14:hiddenFill>
             </a:ext>
@@ -14559,14 +15077,14 @@
           </a:ln>
           <a:extLst>
             <a:ext uri="{909E8E84-426E-40dd-AFC4-6F175D3DCCD1}">
-              <a14:hiddenFill xmlns="" xmlns:a14="http://schemas.microsoft.com/office/drawing/2010/main">
+              <a14:hiddenFill xmlns:a14="http://schemas.microsoft.com/office/drawing/2010/main" xmlns="">
                 <a:solidFill>
                   <a:srgbClr val="FFFFFF"/>
                 </a:solidFill>
               </a14:hiddenFill>
             </a:ext>
             <a:ext uri="{91240B29-F687-4f45-9708-019B960494DF}">
-              <a14:hiddenLine xmlns="" xmlns:a14="http://schemas.microsoft.com/office/drawing/2010/main" w="9525">
+              <a14:hiddenLine xmlns:a14="http://schemas.microsoft.com/office/drawing/2010/main" xmlns="" w="9525">
                 <a:solidFill>
                   <a:srgbClr val="000000"/>
                 </a:solidFill>
@@ -14737,14 +15255,14 @@
           </a:ln>
           <a:extLst>
             <a:ext uri="{909E8E84-426E-40dd-AFC4-6F175D3DCCD1}">
-              <a14:hiddenFill xmlns="" xmlns:a14="http://schemas.microsoft.com/office/drawing/2010/main">
+              <a14:hiddenFill xmlns:a14="http://schemas.microsoft.com/office/drawing/2010/main" xmlns="">
                 <a:solidFill>
                   <a:srgbClr val="FFFFFF"/>
                 </a:solidFill>
               </a14:hiddenFill>
             </a:ext>
             <a:ext uri="{91240B29-F687-4f45-9708-019B960494DF}">
-              <a14:hiddenLine xmlns="" xmlns:a14="http://schemas.microsoft.com/office/drawing/2010/main" w="9525">
+              <a14:hiddenLine xmlns:a14="http://schemas.microsoft.com/office/drawing/2010/main" xmlns="" w="9525">
                 <a:solidFill>
                   <a:srgbClr val="000000"/>
                 </a:solidFill>
@@ -14915,14 +15433,14 @@
           </a:ln>
           <a:extLst>
             <a:ext uri="{909E8E84-426E-40dd-AFC4-6F175D3DCCD1}">
-              <a14:hiddenFill xmlns="" xmlns:a14="http://schemas.microsoft.com/office/drawing/2010/main">
+              <a14:hiddenFill xmlns:a14="http://schemas.microsoft.com/office/drawing/2010/main" xmlns="">
                 <a:solidFill>
                   <a:srgbClr val="FFFFFF"/>
                 </a:solidFill>
               </a14:hiddenFill>
             </a:ext>
             <a:ext uri="{91240B29-F687-4f45-9708-019B960494DF}">
-              <a14:hiddenLine xmlns="" xmlns:a14="http://schemas.microsoft.com/office/drawing/2010/main" w="9525">
+              <a14:hiddenLine xmlns:a14="http://schemas.microsoft.com/office/drawing/2010/main" xmlns="" w="9525">
                 <a:solidFill>
                   <a:srgbClr val="000000"/>
                 </a:solidFill>
@@ -15093,14 +15611,14 @@
           </a:ln>
           <a:extLst>
             <a:ext uri="{909E8E84-426E-40dd-AFC4-6F175D3DCCD1}">
-              <a14:hiddenFill xmlns="" xmlns:a14="http://schemas.microsoft.com/office/drawing/2010/main">
+              <a14:hiddenFill xmlns:a14="http://schemas.microsoft.com/office/drawing/2010/main" xmlns="">
                 <a:solidFill>
                   <a:srgbClr val="FFFFFF"/>
                 </a:solidFill>
               </a14:hiddenFill>
             </a:ext>
             <a:ext uri="{91240B29-F687-4f45-9708-019B960494DF}">
-              <a14:hiddenLine xmlns="" xmlns:a14="http://schemas.microsoft.com/office/drawing/2010/main" w="9525">
+              <a14:hiddenLine xmlns:a14="http://schemas.microsoft.com/office/drawing/2010/main" xmlns="" w="9525">
                 <a:solidFill>
                   <a:srgbClr val="000000"/>
                 </a:solidFill>
@@ -15337,7 +15855,7 @@
           </a:ln>
           <a:extLst>
             <a:ext uri="{909E8E84-426E-40dd-AFC4-6F175D3DCCD1}">
-              <a14:hiddenFill xmlns="" xmlns:a14="http://schemas.microsoft.com/office/drawing/2010/main">
+              <a14:hiddenFill xmlns:a14="http://schemas.microsoft.com/office/drawing/2010/main" xmlns="">
                 <a:noFill/>
               </a14:hiddenFill>
             </a:ext>
@@ -16878,14 +17396,14 @@
           </a:ln>
           <a:extLst>
             <a:ext uri="{909E8E84-426E-40dd-AFC4-6F175D3DCCD1}">
-              <a14:hiddenFill xmlns="" xmlns:a14="http://schemas.microsoft.com/office/drawing/2010/main">
+              <a14:hiddenFill xmlns:a14="http://schemas.microsoft.com/office/drawing/2010/main" xmlns="">
                 <a:solidFill>
                   <a:srgbClr val="FFFFFF"/>
                 </a:solidFill>
               </a14:hiddenFill>
             </a:ext>
             <a:ext uri="{91240B29-F687-4f45-9708-019B960494DF}">
-              <a14:hiddenLine xmlns="" xmlns:a14="http://schemas.microsoft.com/office/drawing/2010/main" w="9525">
+              <a14:hiddenLine xmlns:a14="http://schemas.microsoft.com/office/drawing/2010/main" xmlns="" w="9525">
                 <a:solidFill>
                   <a:srgbClr val="000000"/>
                 </a:solidFill>
@@ -17056,14 +17574,14 @@
           </a:ln>
           <a:extLst>
             <a:ext uri="{909E8E84-426E-40dd-AFC4-6F175D3DCCD1}">
-              <a14:hiddenFill xmlns="" xmlns:a14="http://schemas.microsoft.com/office/drawing/2010/main">
+              <a14:hiddenFill xmlns:a14="http://schemas.microsoft.com/office/drawing/2010/main" xmlns="">
                 <a:solidFill>
                   <a:srgbClr val="FFFFFF"/>
                 </a:solidFill>
               </a14:hiddenFill>
             </a:ext>
             <a:ext uri="{91240B29-F687-4f45-9708-019B960494DF}">
-              <a14:hiddenLine xmlns="" xmlns:a14="http://schemas.microsoft.com/office/drawing/2010/main" w="9525">
+              <a14:hiddenLine xmlns:a14="http://schemas.microsoft.com/office/drawing/2010/main" xmlns="" w="9525">
                 <a:solidFill>
                   <a:srgbClr val="000000"/>
                 </a:solidFill>
@@ -17914,7 +18432,7 @@
           </a:ln>
           <a:extLst>
             <a:ext uri="{909E8E84-426E-40dd-AFC4-6F175D3DCCD1}">
-              <a14:hiddenFill xmlns="" xmlns:a14="http://schemas.microsoft.com/office/drawing/2010/main">
+              <a14:hiddenFill xmlns:a14="http://schemas.microsoft.com/office/drawing/2010/main" xmlns="">
                 <a:noFill/>
               </a14:hiddenFill>
             </a:ext>
@@ -18015,7 +18533,7 @@
           </a:ln>
           <a:extLst>
             <a:ext uri="{909E8E84-426E-40dd-AFC4-6F175D3DCCD1}">
-              <a14:hiddenFill xmlns="" xmlns:a14="http://schemas.microsoft.com/office/drawing/2010/main">
+              <a14:hiddenFill xmlns:a14="http://schemas.microsoft.com/office/drawing/2010/main" xmlns="">
                 <a:noFill/>
               </a14:hiddenFill>
             </a:ext>
@@ -18062,7 +18580,7 @@
           </a:ln>
           <a:extLst>
             <a:ext uri="{909E8E84-426E-40dd-AFC4-6F175D3DCCD1}">
-              <a14:hiddenFill xmlns="" xmlns:a14="http://schemas.microsoft.com/office/drawing/2010/main">
+              <a14:hiddenFill xmlns:a14="http://schemas.microsoft.com/office/drawing/2010/main" xmlns="">
                 <a:noFill/>
               </a14:hiddenFill>
             </a:ext>
@@ -18109,7 +18627,7 @@
           </a:ln>
           <a:extLst>
             <a:ext uri="{909E8E84-426E-40dd-AFC4-6F175D3DCCD1}">
-              <a14:hiddenFill xmlns="" xmlns:a14="http://schemas.microsoft.com/office/drawing/2010/main">
+              <a14:hiddenFill xmlns:a14="http://schemas.microsoft.com/office/drawing/2010/main" xmlns="">
                 <a:noFill/>
               </a14:hiddenFill>
             </a:ext>
@@ -18217,7 +18735,7 @@
           </a:ln>
           <a:extLst>
             <a:ext uri="{909E8E84-426E-40dd-AFC4-6F175D3DCCD1}">
-              <a14:hiddenFill xmlns="" xmlns:a14="http://schemas.microsoft.com/office/drawing/2010/main">
+              <a14:hiddenFill xmlns:a14="http://schemas.microsoft.com/office/drawing/2010/main" xmlns="">
                 <a:noFill/>
               </a14:hiddenFill>
             </a:ext>
@@ -18538,7 +19056,7 @@
           </a:ln>
           <a:extLst>
             <a:ext uri="{909E8E84-426E-40dd-AFC4-6F175D3DCCD1}">
-              <a14:hiddenFill xmlns="" xmlns:a14="http://schemas.microsoft.com/office/drawing/2010/main">
+              <a14:hiddenFill xmlns:a14="http://schemas.microsoft.com/office/drawing/2010/main" xmlns="">
                 <a:noFill/>
               </a14:hiddenFill>
             </a:ext>
@@ -18639,7 +19157,7 @@
           </a:ln>
           <a:extLst>
             <a:ext uri="{909E8E84-426E-40dd-AFC4-6F175D3DCCD1}">
-              <a14:hiddenFill xmlns="" xmlns:a14="http://schemas.microsoft.com/office/drawing/2010/main">
+              <a14:hiddenFill xmlns:a14="http://schemas.microsoft.com/office/drawing/2010/main" xmlns="">
                 <a:noFill/>
               </a14:hiddenFill>
             </a:ext>
@@ -18686,7 +19204,7 @@
           </a:ln>
           <a:extLst>
             <a:ext uri="{909E8E84-426E-40dd-AFC4-6F175D3DCCD1}">
-              <a14:hiddenFill xmlns="" xmlns:a14="http://schemas.microsoft.com/office/drawing/2010/main">
+              <a14:hiddenFill xmlns:a14="http://schemas.microsoft.com/office/drawing/2010/main" xmlns="">
                 <a:noFill/>
               </a14:hiddenFill>
             </a:ext>
@@ -18733,7 +19251,7 @@
           </a:ln>
           <a:extLst>
             <a:ext uri="{909E8E84-426E-40dd-AFC4-6F175D3DCCD1}">
-              <a14:hiddenFill xmlns="" xmlns:a14="http://schemas.microsoft.com/office/drawing/2010/main">
+              <a14:hiddenFill xmlns:a14="http://schemas.microsoft.com/office/drawing/2010/main" xmlns="">
                 <a:noFill/>
               </a14:hiddenFill>
             </a:ext>
@@ -18841,7 +19359,7 @@
           </a:ln>
           <a:extLst>
             <a:ext uri="{909E8E84-426E-40dd-AFC4-6F175D3DCCD1}">
-              <a14:hiddenFill xmlns="" xmlns:a14="http://schemas.microsoft.com/office/drawing/2010/main">
+              <a14:hiddenFill xmlns:a14="http://schemas.microsoft.com/office/drawing/2010/main" xmlns="">
                 <a:noFill/>
               </a14:hiddenFill>
             </a:ext>
@@ -19015,7 +19533,7 @@
           </a:ln>
           <a:extLst>
             <a:ext uri="{909E8E84-426E-40dd-AFC4-6F175D3DCCD1}">
-              <a14:hiddenFill xmlns="" xmlns:a14="http://schemas.microsoft.com/office/drawing/2010/main">
+              <a14:hiddenFill xmlns:a14="http://schemas.microsoft.com/office/drawing/2010/main" xmlns="">
                 <a:noFill/>
               </a14:hiddenFill>
             </a:ext>
@@ -19116,7 +19634,7 @@
           </a:ln>
           <a:extLst>
             <a:ext uri="{909E8E84-426E-40dd-AFC4-6F175D3DCCD1}">
-              <a14:hiddenFill xmlns="" xmlns:a14="http://schemas.microsoft.com/office/drawing/2010/main">
+              <a14:hiddenFill xmlns:a14="http://schemas.microsoft.com/office/drawing/2010/main" xmlns="">
                 <a:noFill/>
               </a14:hiddenFill>
             </a:ext>
@@ -19163,7 +19681,7 @@
           </a:ln>
           <a:extLst>
             <a:ext uri="{909E8E84-426E-40dd-AFC4-6F175D3DCCD1}">
-              <a14:hiddenFill xmlns="" xmlns:a14="http://schemas.microsoft.com/office/drawing/2010/main">
+              <a14:hiddenFill xmlns:a14="http://schemas.microsoft.com/office/drawing/2010/main" xmlns="">
                 <a:noFill/>
               </a14:hiddenFill>
             </a:ext>
@@ -19250,14 +19768,14 @@
           </a:ln>
           <a:extLst>
             <a:ext uri="{909E8E84-426E-40dd-AFC4-6F175D3DCCD1}">
-              <a14:hiddenFill xmlns="" xmlns:a14="http://schemas.microsoft.com/office/drawing/2010/main">
+              <a14:hiddenFill xmlns:a14="http://schemas.microsoft.com/office/drawing/2010/main" xmlns="">
                 <a:solidFill>
                   <a:srgbClr val="FFFFFF"/>
                 </a:solidFill>
               </a14:hiddenFill>
             </a:ext>
             <a:ext uri="{91240B29-F687-4f45-9708-019B960494DF}">
-              <a14:hiddenLine xmlns="" xmlns:a14="http://schemas.microsoft.com/office/drawing/2010/main" w="9525">
+              <a14:hiddenLine xmlns:a14="http://schemas.microsoft.com/office/drawing/2010/main" xmlns="" w="9525">
                 <a:solidFill>
                   <a:srgbClr val="000000"/>
                 </a:solidFill>
@@ -19428,14 +19946,14 @@
           </a:ln>
           <a:extLst>
             <a:ext uri="{909E8E84-426E-40dd-AFC4-6F175D3DCCD1}">
-              <a14:hiddenFill xmlns="" xmlns:a14="http://schemas.microsoft.com/office/drawing/2010/main">
+              <a14:hiddenFill xmlns:a14="http://schemas.microsoft.com/office/drawing/2010/main" xmlns="">
                 <a:solidFill>
                   <a:srgbClr val="FFFFFF"/>
                 </a:solidFill>
               </a14:hiddenFill>
             </a:ext>
             <a:ext uri="{91240B29-F687-4f45-9708-019B960494DF}">
-              <a14:hiddenLine xmlns="" xmlns:a14="http://schemas.microsoft.com/office/drawing/2010/main" w="9525">
+              <a14:hiddenLine xmlns:a14="http://schemas.microsoft.com/office/drawing/2010/main" xmlns="" w="9525">
                 <a:solidFill>
                   <a:srgbClr val="000000"/>
                 </a:solidFill>
@@ -19724,7 +20242,7 @@
             </a:ln>
             <a:extLst>
               <a:ext uri="{909E8E84-426E-40dd-AFC4-6F175D3DCCD1}">
-                <a14:hiddenFill xmlns="" xmlns:a14="http://schemas.microsoft.com/office/drawing/2010/main">
+                <a14:hiddenFill xmlns:a14="http://schemas.microsoft.com/office/drawing/2010/main" xmlns="">
                   <a:solidFill>
                     <a:srgbClr val="FFFFFF"/>
                   </a:solidFill>
@@ -19883,7 +20401,7 @@
             </a:ln>
             <a:extLst>
               <a:ext uri="{909E8E84-426E-40dd-AFC4-6F175D3DCCD1}">
-                <a14:hiddenFill xmlns="" xmlns:a14="http://schemas.microsoft.com/office/drawing/2010/main">
+                <a14:hiddenFill xmlns:a14="http://schemas.microsoft.com/office/drawing/2010/main" xmlns="">
                   <a:noFill/>
                 </a14:hiddenFill>
               </a:ext>
@@ -19930,7 +20448,7 @@
             </a:ln>
             <a:extLst>
               <a:ext uri="{909E8E84-426E-40dd-AFC4-6F175D3DCCD1}">
-                <a14:hiddenFill xmlns="" xmlns:a14="http://schemas.microsoft.com/office/drawing/2010/main">
+                <a14:hiddenFill xmlns:a14="http://schemas.microsoft.com/office/drawing/2010/main" xmlns="">
                   <a:noFill/>
                 </a14:hiddenFill>
               </a:ext>
@@ -19977,7 +20495,7 @@
             </a:ln>
             <a:extLst>
               <a:ext uri="{909E8E84-426E-40dd-AFC4-6F175D3DCCD1}">
-                <a14:hiddenFill xmlns="" xmlns:a14="http://schemas.microsoft.com/office/drawing/2010/main">
+                <a14:hiddenFill xmlns:a14="http://schemas.microsoft.com/office/drawing/2010/main" xmlns="">
                   <a:noFill/>
                 </a14:hiddenFill>
               </a:ext>
@@ -20024,7 +20542,7 @@
             </a:ln>
             <a:extLst>
               <a:ext uri="{909E8E84-426E-40dd-AFC4-6F175D3DCCD1}">
-                <a14:hiddenFill xmlns="" xmlns:a14="http://schemas.microsoft.com/office/drawing/2010/main">
+                <a14:hiddenFill xmlns:a14="http://schemas.microsoft.com/office/drawing/2010/main" xmlns="">
                   <a:noFill/>
                 </a14:hiddenFill>
               </a:ext>
@@ -20067,14 +20585,14 @@
           </a:ln>
           <a:extLst>
             <a:ext uri="{909E8E84-426E-40dd-AFC4-6F175D3DCCD1}">
-              <a14:hiddenFill xmlns="" xmlns:a14="http://schemas.microsoft.com/office/drawing/2010/main">
+              <a14:hiddenFill xmlns:a14="http://schemas.microsoft.com/office/drawing/2010/main" xmlns="">
                 <a:solidFill>
                   <a:srgbClr val="FFFFFF"/>
                 </a:solidFill>
               </a14:hiddenFill>
             </a:ext>
             <a:ext uri="{91240B29-F687-4f45-9708-019B960494DF}">
-              <a14:hiddenLine xmlns="" xmlns:a14="http://schemas.microsoft.com/office/drawing/2010/main" w="9525">
+              <a14:hiddenLine xmlns:a14="http://schemas.microsoft.com/office/drawing/2010/main" xmlns="" w="9525">
                 <a:solidFill>
                   <a:srgbClr val="000000"/>
                 </a:solidFill>
@@ -20532,14 +21050,14 @@
           </a:ln>
           <a:extLst>
             <a:ext uri="{909E8E84-426E-40dd-AFC4-6F175D3DCCD1}">
-              <a14:hiddenFill xmlns="" xmlns:a14="http://schemas.microsoft.com/office/drawing/2010/main">
+              <a14:hiddenFill xmlns:a14="http://schemas.microsoft.com/office/drawing/2010/main" xmlns="">
                 <a:solidFill>
                   <a:srgbClr val="FFFFFF"/>
                 </a:solidFill>
               </a14:hiddenFill>
             </a:ext>
             <a:ext uri="{91240B29-F687-4f45-9708-019B960494DF}">
-              <a14:hiddenLine xmlns="" xmlns:a14="http://schemas.microsoft.com/office/drawing/2010/main" w="9525">
+              <a14:hiddenLine xmlns:a14="http://schemas.microsoft.com/office/drawing/2010/main" xmlns="" w="9525">
                 <a:solidFill>
                   <a:srgbClr val="000000"/>
                 </a:solidFill>
@@ -20710,14 +21228,14 @@
           </a:ln>
           <a:extLst>
             <a:ext uri="{909E8E84-426E-40dd-AFC4-6F175D3DCCD1}">
-              <a14:hiddenFill xmlns="" xmlns:a14="http://schemas.microsoft.com/office/drawing/2010/main">
+              <a14:hiddenFill xmlns:a14="http://schemas.microsoft.com/office/drawing/2010/main" xmlns="">
                 <a:solidFill>
                   <a:srgbClr val="FFFFFF"/>
                 </a:solidFill>
               </a14:hiddenFill>
             </a:ext>
             <a:ext uri="{91240B29-F687-4f45-9708-019B960494DF}">
-              <a14:hiddenLine xmlns="" xmlns:a14="http://schemas.microsoft.com/office/drawing/2010/main" w="9525">
+              <a14:hiddenLine xmlns:a14="http://schemas.microsoft.com/office/drawing/2010/main" xmlns="" w="9525">
                 <a:solidFill>
                   <a:srgbClr val="000000"/>
                 </a:solidFill>
@@ -20932,14 +21450,14 @@
           </a:ln>
           <a:extLst>
             <a:ext uri="{909E8E84-426E-40dd-AFC4-6F175D3DCCD1}">
-              <a14:hiddenFill xmlns="" xmlns:a14="http://schemas.microsoft.com/office/drawing/2010/main">
+              <a14:hiddenFill xmlns:a14="http://schemas.microsoft.com/office/drawing/2010/main" xmlns="">
                 <a:solidFill>
                   <a:srgbClr val="FFFFFF"/>
                 </a:solidFill>
               </a14:hiddenFill>
             </a:ext>
             <a:ext uri="{91240B29-F687-4f45-9708-019B960494DF}">
-              <a14:hiddenLine xmlns="" xmlns:a14="http://schemas.microsoft.com/office/drawing/2010/main" w="9525">
+              <a14:hiddenLine xmlns:a14="http://schemas.microsoft.com/office/drawing/2010/main" xmlns="" w="9525">
                 <a:solidFill>
                   <a:srgbClr val="000000"/>
                 </a:solidFill>
@@ -21154,14 +21672,14 @@
           </a:ln>
           <a:extLst>
             <a:ext uri="{909E8E84-426E-40dd-AFC4-6F175D3DCCD1}">
-              <a14:hiddenFill xmlns="" xmlns:a14="http://schemas.microsoft.com/office/drawing/2010/main">
+              <a14:hiddenFill xmlns:a14="http://schemas.microsoft.com/office/drawing/2010/main" xmlns="">
                 <a:solidFill>
                   <a:srgbClr val="FFFFFF"/>
                 </a:solidFill>
               </a14:hiddenFill>
             </a:ext>
             <a:ext uri="{91240B29-F687-4f45-9708-019B960494DF}">
-              <a14:hiddenLine xmlns="" xmlns:a14="http://schemas.microsoft.com/office/drawing/2010/main" w="9525">
+              <a14:hiddenLine xmlns:a14="http://schemas.microsoft.com/office/drawing/2010/main" xmlns="" w="9525">
                 <a:solidFill>
                   <a:srgbClr val="000000"/>
                 </a:solidFill>
@@ -21378,14 +21896,14 @@
           </a:ln>
           <a:extLst>
             <a:ext uri="{909E8E84-426E-40dd-AFC4-6F175D3DCCD1}">
-              <a14:hiddenFill xmlns="" xmlns:a14="http://schemas.microsoft.com/office/drawing/2010/main">
+              <a14:hiddenFill xmlns:a14="http://schemas.microsoft.com/office/drawing/2010/main" xmlns="">
                 <a:solidFill>
                   <a:srgbClr val="FFFFFF"/>
                 </a:solidFill>
               </a14:hiddenFill>
             </a:ext>
             <a:ext uri="{91240B29-F687-4f45-9708-019B960494DF}">
-              <a14:hiddenLine xmlns="" xmlns:a14="http://schemas.microsoft.com/office/drawing/2010/main" w="9525">
+              <a14:hiddenLine xmlns:a14="http://schemas.microsoft.com/office/drawing/2010/main" xmlns="" w="9525">
                 <a:solidFill>
                   <a:srgbClr val="000000"/>
                 </a:solidFill>
@@ -21674,7 +22192,7 @@
             </a:ln>
             <a:extLst>
               <a:ext uri="{909E8E84-426E-40dd-AFC4-6F175D3DCCD1}">
-                <a14:hiddenFill xmlns="" xmlns:a14="http://schemas.microsoft.com/office/drawing/2010/main">
+                <a14:hiddenFill xmlns:a14="http://schemas.microsoft.com/office/drawing/2010/main" xmlns="">
                   <a:solidFill>
                     <a:srgbClr val="FFFFFF"/>
                   </a:solidFill>
@@ -21833,7 +22351,7 @@
             </a:ln>
             <a:extLst>
               <a:ext uri="{909E8E84-426E-40dd-AFC4-6F175D3DCCD1}">
-                <a14:hiddenFill xmlns="" xmlns:a14="http://schemas.microsoft.com/office/drawing/2010/main">
+                <a14:hiddenFill xmlns:a14="http://schemas.microsoft.com/office/drawing/2010/main" xmlns="">
                   <a:noFill/>
                 </a14:hiddenFill>
               </a:ext>
@@ -21880,7 +22398,7 @@
             </a:ln>
             <a:extLst>
               <a:ext uri="{909E8E84-426E-40dd-AFC4-6F175D3DCCD1}">
-                <a14:hiddenFill xmlns="" xmlns:a14="http://schemas.microsoft.com/office/drawing/2010/main">
+                <a14:hiddenFill xmlns:a14="http://schemas.microsoft.com/office/drawing/2010/main" xmlns="">
                   <a:noFill/>
                 </a14:hiddenFill>
               </a:ext>
@@ -21927,7 +22445,7 @@
             </a:ln>
             <a:extLst>
               <a:ext uri="{909E8E84-426E-40dd-AFC4-6F175D3DCCD1}">
-                <a14:hiddenFill xmlns="" xmlns:a14="http://schemas.microsoft.com/office/drawing/2010/main">
+                <a14:hiddenFill xmlns:a14="http://schemas.microsoft.com/office/drawing/2010/main" xmlns="">
                   <a:noFill/>
                 </a14:hiddenFill>
               </a:ext>
@@ -21974,7 +22492,7 @@
             </a:ln>
             <a:extLst>
               <a:ext uri="{909E8E84-426E-40dd-AFC4-6F175D3DCCD1}">
-                <a14:hiddenFill xmlns="" xmlns:a14="http://schemas.microsoft.com/office/drawing/2010/main">
+                <a14:hiddenFill xmlns:a14="http://schemas.microsoft.com/office/drawing/2010/main" xmlns="">
                   <a:noFill/>
                 </a14:hiddenFill>
               </a:ext>
@@ -22017,14 +22535,14 @@
           </a:ln>
           <a:extLst>
             <a:ext uri="{909E8E84-426E-40dd-AFC4-6F175D3DCCD1}">
-              <a14:hiddenFill xmlns="" xmlns:a14="http://schemas.microsoft.com/office/drawing/2010/main">
+              <a14:hiddenFill xmlns:a14="http://schemas.microsoft.com/office/drawing/2010/main" xmlns="">
                 <a:solidFill>
                   <a:srgbClr val="FFFFFF"/>
                 </a:solidFill>
               </a14:hiddenFill>
             </a:ext>
             <a:ext uri="{91240B29-F687-4f45-9708-019B960494DF}">
-              <a14:hiddenLine xmlns="" xmlns:a14="http://schemas.microsoft.com/office/drawing/2010/main" w="9525">
+              <a14:hiddenLine xmlns:a14="http://schemas.microsoft.com/office/drawing/2010/main" xmlns="" w="9525">
                 <a:solidFill>
                   <a:srgbClr val="000000"/>
                 </a:solidFill>
@@ -23026,14 +23544,14 @@
           </a:ln>
           <a:extLst>
             <a:ext uri="{909E8E84-426E-40dd-AFC4-6F175D3DCCD1}">
-              <a14:hiddenFill xmlns="" xmlns:a14="http://schemas.microsoft.com/office/drawing/2010/main">
+              <a14:hiddenFill xmlns:a14="http://schemas.microsoft.com/office/drawing/2010/main" xmlns="">
                 <a:solidFill>
                   <a:srgbClr val="FFFFFF"/>
                 </a:solidFill>
               </a14:hiddenFill>
             </a:ext>
             <a:ext uri="{91240B29-F687-4f45-9708-019B960494DF}">
-              <a14:hiddenLine xmlns="" xmlns:a14="http://schemas.microsoft.com/office/drawing/2010/main" w="9525">
+              <a14:hiddenLine xmlns:a14="http://schemas.microsoft.com/office/drawing/2010/main" xmlns="" w="9525">
                 <a:solidFill>
                   <a:srgbClr val="000000"/>
                 </a:solidFill>
@@ -23210,14 +23728,14 @@
           </a:ln>
           <a:extLst>
             <a:ext uri="{909E8E84-426E-40dd-AFC4-6F175D3DCCD1}">
-              <a14:hiddenFill xmlns="" xmlns:a14="http://schemas.microsoft.com/office/drawing/2010/main">
+              <a14:hiddenFill xmlns:a14="http://schemas.microsoft.com/office/drawing/2010/main" xmlns="">
                 <a:solidFill>
                   <a:srgbClr val="FFFFFF"/>
                 </a:solidFill>
               </a14:hiddenFill>
             </a:ext>
             <a:ext uri="{91240B29-F687-4f45-9708-019B960494DF}">
-              <a14:hiddenLine xmlns="" xmlns:a14="http://schemas.microsoft.com/office/drawing/2010/main" w="9525">
+              <a14:hiddenLine xmlns:a14="http://schemas.microsoft.com/office/drawing/2010/main" xmlns="" w="9525">
                 <a:solidFill>
                   <a:srgbClr val="000000"/>
                 </a:solidFill>
@@ -23394,14 +23912,14 @@
           </a:ln>
           <a:extLst>
             <a:ext uri="{909E8E84-426E-40dd-AFC4-6F175D3DCCD1}">
-              <a14:hiddenFill xmlns="" xmlns:a14="http://schemas.microsoft.com/office/drawing/2010/main">
+              <a14:hiddenFill xmlns:a14="http://schemas.microsoft.com/office/drawing/2010/main" xmlns="">
                 <a:solidFill>
                   <a:srgbClr val="FFFFFF"/>
                 </a:solidFill>
               </a14:hiddenFill>
             </a:ext>
             <a:ext uri="{91240B29-F687-4f45-9708-019B960494DF}">
-              <a14:hiddenLine xmlns="" xmlns:a14="http://schemas.microsoft.com/office/drawing/2010/main" w="9525">
+              <a14:hiddenLine xmlns:a14="http://schemas.microsoft.com/office/drawing/2010/main" xmlns="" w="9525">
                 <a:solidFill>
                   <a:srgbClr val="000000"/>
                 </a:solidFill>
@@ -23578,14 +24096,14 @@
           </a:ln>
           <a:extLst>
             <a:ext uri="{909E8E84-426E-40dd-AFC4-6F175D3DCCD1}">
-              <a14:hiddenFill xmlns="" xmlns:a14="http://schemas.microsoft.com/office/drawing/2010/main">
+              <a14:hiddenFill xmlns:a14="http://schemas.microsoft.com/office/drawing/2010/main" xmlns="">
                 <a:solidFill>
                   <a:srgbClr val="FFFFFF"/>
                 </a:solidFill>
               </a14:hiddenFill>
             </a:ext>
             <a:ext uri="{91240B29-F687-4f45-9708-019B960494DF}">
-              <a14:hiddenLine xmlns="" xmlns:a14="http://schemas.microsoft.com/office/drawing/2010/main" w="9525">
+              <a14:hiddenLine xmlns:a14="http://schemas.microsoft.com/office/drawing/2010/main" xmlns="" w="9525">
                 <a:solidFill>
                   <a:srgbClr val="000000"/>
                 </a:solidFill>
@@ -23762,14 +24280,14 @@
           </a:ln>
           <a:extLst>
             <a:ext uri="{909E8E84-426E-40dd-AFC4-6F175D3DCCD1}">
-              <a14:hiddenFill xmlns="" xmlns:a14="http://schemas.microsoft.com/office/drawing/2010/main">
+              <a14:hiddenFill xmlns:a14="http://schemas.microsoft.com/office/drawing/2010/main" xmlns="">
                 <a:solidFill>
                   <a:srgbClr val="FFFFFF"/>
                 </a:solidFill>
               </a14:hiddenFill>
             </a:ext>
             <a:ext uri="{91240B29-F687-4f45-9708-019B960494DF}">
-              <a14:hiddenLine xmlns="" xmlns:a14="http://schemas.microsoft.com/office/drawing/2010/main" w="9525">
+              <a14:hiddenLine xmlns:a14="http://schemas.microsoft.com/office/drawing/2010/main" xmlns="" w="9525">
                 <a:solidFill>
                   <a:srgbClr val="000000"/>
                 </a:solidFill>
@@ -23943,14 +24461,14 @@
           </a:ln>
           <a:extLst>
             <a:ext uri="{909E8E84-426E-40dd-AFC4-6F175D3DCCD1}">
-              <a14:hiddenFill xmlns="" xmlns:a14="http://schemas.microsoft.com/office/drawing/2010/main">
+              <a14:hiddenFill xmlns:a14="http://schemas.microsoft.com/office/drawing/2010/main" xmlns="">
                 <a:solidFill>
                   <a:srgbClr val="FFFFFF"/>
                 </a:solidFill>
               </a14:hiddenFill>
             </a:ext>
             <a:ext uri="{91240B29-F687-4f45-9708-019B960494DF}">
-              <a14:hiddenLine xmlns="" xmlns:a14="http://schemas.microsoft.com/office/drawing/2010/main" w="9525">
+              <a14:hiddenLine xmlns:a14="http://schemas.microsoft.com/office/drawing/2010/main" xmlns="" w="9525">
                 <a:solidFill>
                   <a:srgbClr val="000000"/>
                 </a:solidFill>

</xml_diff>